<commit_message>
Upd Django REST framework 学習内容整理
</commit_message>
<xml_diff>
--- a/学習内容整理.pptx
+++ b/学習内容整理.pptx
@@ -7,6 +7,7 @@
   <p:sldIdLst>
     <p:sldId id="256" r:id="rId2"/>
     <p:sldId id="257" r:id="rId3"/>
+    <p:sldId id="258" r:id="rId4"/>
   </p:sldIdLst>
   <p:sldSz cx="12192000" cy="6858000"/>
   <p:notesSz cx="6858000" cy="9144000"/>
@@ -747,9 +748,9 @@
             <a:fld id="{B61BEF0D-F0BB-DE4B-95CE-6DB70DBA9567}" type="datetimeFigureOut">
               <a:rPr lang="en-US" smtClean="0"/>
               <a:pPr/>
-              <a:t>3/27/2021</a:t>
+              <a:t>3/28/2021</a:t>
             </a:fld>
-            <a:endParaRPr lang="en-US" dirty="0"/>
+            <a:endParaRPr lang="en-US"/>
           </a:p>
         </p:txBody>
       </p:sp>
@@ -768,7 +769,7 @@
           <a:bodyPr/>
           <a:lstStyle/>
           <a:p>
-            <a:endParaRPr lang="en-US" dirty="0"/>
+            <a:endParaRPr lang="en-US"/>
           </a:p>
         </p:txBody>
       </p:sp>
@@ -792,7 +793,7 @@
               <a:pPr/>
               <a:t>‹#›</a:t>
             </a:fld>
-            <a:endParaRPr lang="en-US" dirty="0"/>
+            <a:endParaRPr lang="en-US"/>
           </a:p>
         </p:txBody>
       </p:sp>
@@ -1000,9 +1001,9 @@
             <a:fld id="{B61BEF0D-F0BB-DE4B-95CE-6DB70DBA9567}" type="datetimeFigureOut">
               <a:rPr lang="en-US" smtClean="0"/>
               <a:pPr/>
-              <a:t>3/27/2021</a:t>
+              <a:t>3/28/2021</a:t>
             </a:fld>
-            <a:endParaRPr lang="en-US" dirty="0"/>
+            <a:endParaRPr lang="en-US"/>
           </a:p>
         </p:txBody>
       </p:sp>
@@ -1021,7 +1022,7 @@
           <a:bodyPr/>
           <a:lstStyle/>
           <a:p>
-            <a:endParaRPr lang="en-US" dirty="0"/>
+            <a:endParaRPr lang="en-US"/>
           </a:p>
         </p:txBody>
       </p:sp>
@@ -1045,7 +1046,7 @@
               <a:pPr/>
               <a:t>‹#›</a:t>
             </a:fld>
-            <a:endParaRPr lang="en-US" dirty="0"/>
+            <a:endParaRPr lang="en-US"/>
           </a:p>
         </p:txBody>
       </p:sp>
@@ -1316,9 +1317,9 @@
             <a:fld id="{B61BEF0D-F0BB-DE4B-95CE-6DB70DBA9567}" type="datetimeFigureOut">
               <a:rPr lang="en-US" smtClean="0"/>
               <a:pPr/>
-              <a:t>3/27/2021</a:t>
+              <a:t>3/28/2021</a:t>
             </a:fld>
-            <a:endParaRPr lang="en-US" dirty="0"/>
+            <a:endParaRPr lang="en-US"/>
           </a:p>
         </p:txBody>
       </p:sp>
@@ -1337,7 +1338,7 @@
           <a:bodyPr/>
           <a:lstStyle/>
           <a:p>
-            <a:endParaRPr lang="en-US" dirty="0"/>
+            <a:endParaRPr lang="en-US"/>
           </a:p>
         </p:txBody>
       </p:sp>
@@ -1361,7 +1362,7 @@
               <a:pPr/>
               <a:t>‹#›</a:t>
             </a:fld>
-            <a:endParaRPr lang="en-US" dirty="0"/>
+            <a:endParaRPr lang="en-US"/>
           </a:p>
         </p:txBody>
       </p:sp>
@@ -1388,7 +1389,7 @@
           <a:p>
             <a:pPr lvl="0"/>
             <a:r>
-              <a:rPr lang="en-US" sz="8000" baseline="0" dirty="0">
+              <a:rPr lang="en-US" sz="8000" baseline="0">
                 <a:ln w="3175" cmpd="sng">
                   <a:noFill/>
                 </a:ln>
@@ -1429,7 +1430,7 @@
           <a:p>
             <a:pPr lvl="0"/>
             <a:r>
-              <a:rPr lang="en-US" sz="8000" baseline="0" dirty="0">
+              <a:rPr lang="en-US" sz="8000" baseline="0">
                 <a:ln w="3175" cmpd="sng">
                   <a:noFill/>
                 </a:ln>
@@ -1443,7 +1444,7 @@
               </a:rPr>
               <a:t>”</a:t>
             </a:r>
-            <a:endParaRPr lang="en-US" dirty="0">
+            <a:endParaRPr lang="en-US">
               <a:solidFill>
                 <a:schemeClr val="accent1">
                   <a:lumMod val="60000"/>
@@ -1659,9 +1660,9 @@
             <a:fld id="{B61BEF0D-F0BB-DE4B-95CE-6DB70DBA9567}" type="datetimeFigureOut">
               <a:rPr lang="en-US" smtClean="0"/>
               <a:pPr/>
-              <a:t>3/27/2021</a:t>
+              <a:t>3/28/2021</a:t>
             </a:fld>
-            <a:endParaRPr lang="en-US" dirty="0"/>
+            <a:endParaRPr lang="en-US"/>
           </a:p>
         </p:txBody>
       </p:sp>
@@ -1680,7 +1681,7 @@
           <a:bodyPr/>
           <a:lstStyle/>
           <a:p>
-            <a:endParaRPr lang="en-US" dirty="0"/>
+            <a:endParaRPr lang="en-US"/>
           </a:p>
         </p:txBody>
       </p:sp>
@@ -1704,7 +1705,7 @@
               <a:pPr/>
               <a:t>‹#›</a:t>
             </a:fld>
-            <a:endParaRPr lang="en-US" dirty="0"/>
+            <a:endParaRPr lang="en-US"/>
           </a:p>
         </p:txBody>
       </p:sp>
@@ -1975,9 +1976,9 @@
             <a:fld id="{B61BEF0D-F0BB-DE4B-95CE-6DB70DBA9567}" type="datetimeFigureOut">
               <a:rPr lang="en-US" smtClean="0"/>
               <a:pPr/>
-              <a:t>3/27/2021</a:t>
+              <a:t>3/28/2021</a:t>
             </a:fld>
-            <a:endParaRPr lang="en-US" dirty="0"/>
+            <a:endParaRPr lang="en-US"/>
           </a:p>
         </p:txBody>
       </p:sp>
@@ -1996,7 +1997,7 @@
           <a:bodyPr/>
           <a:lstStyle/>
           <a:p>
-            <a:endParaRPr lang="en-US" dirty="0"/>
+            <a:endParaRPr lang="en-US"/>
           </a:p>
         </p:txBody>
       </p:sp>
@@ -2020,7 +2021,7 @@
               <a:pPr/>
               <a:t>‹#›</a:t>
             </a:fld>
-            <a:endParaRPr lang="en-US" dirty="0"/>
+            <a:endParaRPr lang="en-US"/>
           </a:p>
         </p:txBody>
       </p:sp>
@@ -2047,7 +2048,7 @@
           <a:p>
             <a:pPr lvl="0"/>
             <a:r>
-              <a:rPr lang="en-US" sz="8000" baseline="0" dirty="0">
+              <a:rPr lang="en-US" sz="8000" baseline="0">
                 <a:ln w="3175" cmpd="sng">
                   <a:noFill/>
                 </a:ln>
@@ -2088,7 +2089,7 @@
           <a:p>
             <a:pPr lvl="0"/>
             <a:r>
-              <a:rPr lang="en-US" sz="8000" baseline="0" dirty="0">
+              <a:rPr lang="en-US" sz="8000" baseline="0">
                 <a:ln w="3175" cmpd="sng">
                   <a:noFill/>
                 </a:ln>
@@ -2370,9 +2371,9 @@
             <a:fld id="{B61BEF0D-F0BB-DE4B-95CE-6DB70DBA9567}" type="datetimeFigureOut">
               <a:rPr lang="en-US" smtClean="0"/>
               <a:pPr/>
-              <a:t>3/27/2021</a:t>
+              <a:t>3/28/2021</a:t>
             </a:fld>
-            <a:endParaRPr lang="en-US" dirty="0"/>
+            <a:endParaRPr lang="en-US"/>
           </a:p>
         </p:txBody>
       </p:sp>
@@ -2391,7 +2392,7 @@
           <a:bodyPr/>
           <a:lstStyle/>
           <a:p>
-            <a:endParaRPr lang="en-US" dirty="0"/>
+            <a:endParaRPr lang="en-US"/>
           </a:p>
         </p:txBody>
       </p:sp>
@@ -2415,7 +2416,7 @@
               <a:pPr/>
               <a:t>‹#›</a:t>
             </a:fld>
-            <a:endParaRPr lang="en-US" dirty="0"/>
+            <a:endParaRPr lang="en-US"/>
           </a:p>
         </p:txBody>
       </p:sp>
@@ -2573,9 +2574,9 @@
           <a:p>
             <a:fld id="{55C6B4A9-1611-4792-9094-5F34BCA07E0B}" type="datetimeFigureOut">
               <a:rPr lang="en-US" smtClean="0"/>
-              <a:t>3/27/2021</a:t>
+              <a:t>3/28/2021</a:t>
             </a:fld>
-            <a:endParaRPr lang="en-US" dirty="0"/>
+            <a:endParaRPr lang="en-US"/>
           </a:p>
         </p:txBody>
       </p:sp>
@@ -2594,7 +2595,7 @@
           <a:bodyPr/>
           <a:lstStyle/>
           <a:p>
-            <a:endParaRPr lang="en-US" dirty="0"/>
+            <a:endParaRPr lang="en-US"/>
           </a:p>
         </p:txBody>
       </p:sp>
@@ -2617,7 +2618,7 @@
               <a:rPr lang="en-US" smtClean="0"/>
               <a:t>‹#›</a:t>
             </a:fld>
-            <a:endParaRPr lang="en-US" dirty="0"/>
+            <a:endParaRPr lang="en-US"/>
           </a:p>
         </p:txBody>
       </p:sp>
@@ -2786,9 +2787,9 @@
             <a:fld id="{B61BEF0D-F0BB-DE4B-95CE-6DB70DBA9567}" type="datetimeFigureOut">
               <a:rPr lang="en-US" smtClean="0"/>
               <a:pPr/>
-              <a:t>3/27/2021</a:t>
+              <a:t>3/28/2021</a:t>
             </a:fld>
-            <a:endParaRPr lang="en-US" dirty="0"/>
+            <a:endParaRPr lang="en-US"/>
           </a:p>
         </p:txBody>
       </p:sp>
@@ -2807,7 +2808,7 @@
           <a:bodyPr/>
           <a:lstStyle/>
           <a:p>
-            <a:endParaRPr lang="en-US" dirty="0"/>
+            <a:endParaRPr lang="en-US"/>
           </a:p>
         </p:txBody>
       </p:sp>
@@ -2831,7 +2832,7 @@
               <a:pPr/>
               <a:t>‹#›</a:t>
             </a:fld>
-            <a:endParaRPr lang="en-US" dirty="0"/>
+            <a:endParaRPr lang="en-US"/>
           </a:p>
         </p:txBody>
       </p:sp>
@@ -2996,9 +2997,9 @@
             <a:fld id="{B61BEF0D-F0BB-DE4B-95CE-6DB70DBA9567}" type="datetimeFigureOut">
               <a:rPr lang="en-US" smtClean="0"/>
               <a:pPr/>
-              <a:t>3/27/2021</a:t>
+              <a:t>3/28/2021</a:t>
             </a:fld>
-            <a:endParaRPr lang="en-US" dirty="0"/>
+            <a:endParaRPr lang="en-US"/>
           </a:p>
         </p:txBody>
       </p:sp>
@@ -3017,7 +3018,7 @@
           <a:bodyPr/>
           <a:lstStyle/>
           <a:p>
-            <a:endParaRPr lang="en-US" dirty="0"/>
+            <a:endParaRPr lang="en-US"/>
           </a:p>
         </p:txBody>
       </p:sp>
@@ -3041,7 +3042,7 @@
               <a:pPr/>
               <a:t>‹#›</a:t>
             </a:fld>
-            <a:endParaRPr lang="en-US" dirty="0"/>
+            <a:endParaRPr lang="en-US"/>
           </a:p>
         </p:txBody>
       </p:sp>
@@ -3245,9 +3246,9 @@
             <a:fld id="{B61BEF0D-F0BB-DE4B-95CE-6DB70DBA9567}" type="datetimeFigureOut">
               <a:rPr lang="en-US" smtClean="0"/>
               <a:pPr/>
-              <a:t>3/27/2021</a:t>
+              <a:t>3/28/2021</a:t>
             </a:fld>
-            <a:endParaRPr lang="en-US" dirty="0"/>
+            <a:endParaRPr lang="en-US"/>
           </a:p>
         </p:txBody>
       </p:sp>
@@ -3266,7 +3267,7 @@
           <a:bodyPr/>
           <a:lstStyle/>
           <a:p>
-            <a:endParaRPr lang="en-US" dirty="0"/>
+            <a:endParaRPr lang="en-US"/>
           </a:p>
         </p:txBody>
       </p:sp>
@@ -3290,7 +3291,7 @@
               <a:pPr/>
               <a:t>‹#›</a:t>
             </a:fld>
-            <a:endParaRPr lang="en-US" dirty="0"/>
+            <a:endParaRPr lang="en-US"/>
           </a:p>
         </p:txBody>
       </p:sp>
@@ -3542,9 +3543,9 @@
           <a:p>
             <a:fld id="{EB712588-04B1-427B-82EE-E8DB90309F08}" type="datetimeFigureOut">
               <a:rPr lang="en-US" smtClean="0"/>
-              <a:t>3/27/2021</a:t>
+              <a:t>3/28/2021</a:t>
             </a:fld>
-            <a:endParaRPr lang="en-US" dirty="0"/>
+            <a:endParaRPr lang="en-US"/>
           </a:p>
         </p:txBody>
       </p:sp>
@@ -3563,7 +3564,7 @@
           <a:bodyPr/>
           <a:lstStyle/>
           <a:p>
-            <a:endParaRPr lang="en-US" dirty="0"/>
+            <a:endParaRPr lang="en-US"/>
           </a:p>
         </p:txBody>
       </p:sp>
@@ -3586,7 +3587,7 @@
               <a:rPr lang="en-US" smtClean="0"/>
               <a:t>‹#›</a:t>
             </a:fld>
-            <a:endParaRPr lang="en-US" dirty="0"/>
+            <a:endParaRPr lang="en-US"/>
           </a:p>
         </p:txBody>
       </p:sp>
@@ -3981,9 +3982,9 @@
             <a:fld id="{B61BEF0D-F0BB-DE4B-95CE-6DB70DBA9567}" type="datetimeFigureOut">
               <a:rPr lang="en-US" smtClean="0"/>
               <a:pPr/>
-              <a:t>3/27/2021</a:t>
+              <a:t>3/28/2021</a:t>
             </a:fld>
-            <a:endParaRPr lang="en-US" dirty="0"/>
+            <a:endParaRPr lang="en-US"/>
           </a:p>
         </p:txBody>
       </p:sp>
@@ -4002,7 +4003,7 @@
           <a:bodyPr/>
           <a:lstStyle/>
           <a:p>
-            <a:endParaRPr lang="en-US" dirty="0"/>
+            <a:endParaRPr lang="en-US"/>
           </a:p>
         </p:txBody>
       </p:sp>
@@ -4026,7 +4027,7 @@
               <a:pPr/>
               <a:t>‹#›</a:t>
             </a:fld>
-            <a:endParaRPr lang="en-US" dirty="0"/>
+            <a:endParaRPr lang="en-US"/>
           </a:p>
         </p:txBody>
       </p:sp>
@@ -4106,9 +4107,9 @@
             <a:fld id="{B61BEF0D-F0BB-DE4B-95CE-6DB70DBA9567}" type="datetimeFigureOut">
               <a:rPr lang="en-US" smtClean="0"/>
               <a:pPr/>
-              <a:t>3/27/2021</a:t>
+              <a:t>3/28/2021</a:t>
             </a:fld>
-            <a:endParaRPr lang="en-US" dirty="0"/>
+            <a:endParaRPr lang="en-US"/>
           </a:p>
         </p:txBody>
       </p:sp>
@@ -4127,7 +4128,7 @@
           <a:bodyPr/>
           <a:lstStyle/>
           <a:p>
-            <a:endParaRPr lang="en-US" dirty="0"/>
+            <a:endParaRPr lang="en-US"/>
           </a:p>
         </p:txBody>
       </p:sp>
@@ -4151,7 +4152,7 @@
               <a:pPr/>
               <a:t>‹#›</a:t>
             </a:fld>
-            <a:endParaRPr lang="en-US" dirty="0"/>
+            <a:endParaRPr lang="en-US"/>
           </a:p>
         </p:txBody>
       </p:sp>
@@ -4203,9 +4204,9 @@
             <a:fld id="{B61BEF0D-F0BB-DE4B-95CE-6DB70DBA9567}" type="datetimeFigureOut">
               <a:rPr lang="en-US" smtClean="0"/>
               <a:pPr/>
-              <a:t>3/27/2021</a:t>
+              <a:t>3/28/2021</a:t>
             </a:fld>
-            <a:endParaRPr lang="en-US" dirty="0"/>
+            <a:endParaRPr lang="en-US"/>
           </a:p>
         </p:txBody>
       </p:sp>
@@ -4224,7 +4225,7 @@
           <a:bodyPr/>
           <a:lstStyle/>
           <a:p>
-            <a:endParaRPr lang="en-US" dirty="0"/>
+            <a:endParaRPr lang="en-US"/>
           </a:p>
         </p:txBody>
       </p:sp>
@@ -4248,7 +4249,7 @@
               <a:pPr/>
               <a:t>‹#›</a:t>
             </a:fld>
-            <a:endParaRPr lang="en-US" dirty="0"/>
+            <a:endParaRPr lang="en-US"/>
           </a:p>
         </p:txBody>
       </p:sp>
@@ -4491,9 +4492,9 @@
           <a:p>
             <a:fld id="{42A54C80-263E-416B-A8E0-580EDEADCBDC}" type="datetimeFigureOut">
               <a:rPr lang="en-US" smtClean="0"/>
-              <a:t>3/27/2021</a:t>
+              <a:t>3/28/2021</a:t>
             </a:fld>
-            <a:endParaRPr lang="en-US" dirty="0"/>
+            <a:endParaRPr lang="en-US"/>
           </a:p>
         </p:txBody>
       </p:sp>
@@ -4512,7 +4513,7 @@
           <a:bodyPr/>
           <a:lstStyle/>
           <a:p>
-            <a:endParaRPr lang="en-US" dirty="0"/>
+            <a:endParaRPr lang="en-US"/>
           </a:p>
         </p:txBody>
       </p:sp>
@@ -4535,7 +4536,7 @@
               <a:rPr lang="en-US" smtClean="0"/>
               <a:t>‹#›</a:t>
             </a:fld>
-            <a:endParaRPr lang="en-US" dirty="0"/>
+            <a:endParaRPr lang="en-US"/>
           </a:p>
         </p:txBody>
       </p:sp>
@@ -4666,7 +4667,7 @@
               <a:rPr lang="ja-JP" altLang="en-US"/>
               <a:t>アイコンをクリックして図を追加</a:t>
             </a:r>
-            <a:endParaRPr lang="en-US" dirty="0"/>
+            <a:endParaRPr lang="en-US"/>
           </a:p>
         </p:txBody>
       </p:sp>
@@ -4755,9 +4756,9 @@
             <a:fld id="{B61BEF0D-F0BB-DE4B-95CE-6DB70DBA9567}" type="datetimeFigureOut">
               <a:rPr lang="en-US" smtClean="0"/>
               <a:pPr/>
-              <a:t>3/27/2021</a:t>
+              <a:t>3/28/2021</a:t>
             </a:fld>
-            <a:endParaRPr lang="en-US" dirty="0"/>
+            <a:endParaRPr lang="en-US"/>
           </a:p>
         </p:txBody>
       </p:sp>
@@ -4776,7 +4777,7 @@
           <a:bodyPr/>
           <a:lstStyle/>
           <a:p>
-            <a:endParaRPr lang="en-US" dirty="0"/>
+            <a:endParaRPr lang="en-US"/>
           </a:p>
         </p:txBody>
       </p:sp>
@@ -4800,7 +4801,7 @@
               <a:pPr/>
               <a:t>‹#›</a:t>
             </a:fld>
-            <a:endParaRPr lang="en-US" dirty="0"/>
+            <a:endParaRPr lang="en-US"/>
           </a:p>
         </p:txBody>
       </p:sp>
@@ -5045,9 +5046,9 @@
             <a:fld id="{B61BEF0D-F0BB-DE4B-95CE-6DB70DBA9567}" type="datetimeFigureOut">
               <a:rPr lang="en-US" smtClean="0"/>
               <a:pPr/>
-              <a:t>3/27/2021</a:t>
+              <a:t>3/28/2021</a:t>
             </a:fld>
-            <a:endParaRPr lang="en-US" dirty="0"/>
+            <a:endParaRPr lang="en-US"/>
           </a:p>
         </p:txBody>
       </p:sp>
@@ -5086,7 +5087,7 @@
             </a:lvl1pPr>
           </a:lstStyle>
           <a:p>
-            <a:endParaRPr lang="en-US" dirty="0"/>
+            <a:endParaRPr lang="en-US"/>
           </a:p>
         </p:txBody>
       </p:sp>
@@ -5128,7 +5129,7 @@
               <a:pPr/>
               <a:t>‹#›</a:t>
             </a:fld>
-            <a:endParaRPr lang="en-US" dirty="0"/>
+            <a:endParaRPr lang="en-US"/>
           </a:p>
         </p:txBody>
       </p:sp>
@@ -5590,9 +5591,10 @@
           <a:lstStyle/>
           <a:p>
             <a:r>
-              <a:rPr kumimoji="1" lang="ja-JP" altLang="en-US" dirty="0"/>
-              <a:t>テンプレート</a:t>
-            </a:r>
+              <a:rPr kumimoji="1" lang="en-US" altLang="ja-JP"/>
+              <a:t>Django REST framework</a:t>
+            </a:r>
+            <a:endParaRPr kumimoji="1" lang="ja-JP" altLang="en-US"/>
           </a:p>
         </p:txBody>
       </p:sp>
@@ -5732,10 +5734,10 @@
           <a:lstStyle/>
           <a:p>
             <a:r>
-              <a:rPr kumimoji="1" lang="en-US" altLang="ja-JP" dirty="0" err="1"/>
+              <a:rPr kumimoji="1" lang="en-US" altLang="ja-JP" err="1"/>
               <a:t>app.serializers</a:t>
             </a:r>
-            <a:endParaRPr kumimoji="1" lang="ja-JP" altLang="en-US" dirty="0"/>
+            <a:endParaRPr kumimoji="1" lang="ja-JP" altLang="en-US"/>
           </a:p>
         </p:txBody>
       </p:sp>
@@ -5781,10 +5783,10 @@
           <a:lstStyle/>
           <a:p>
             <a:r>
-              <a:rPr kumimoji="1" lang="en-US" altLang="ja-JP" dirty="0" err="1"/>
+              <a:rPr kumimoji="1" lang="en-US" altLang="ja-JP" err="1"/>
               <a:t>rest_framework.serializers</a:t>
             </a:r>
-            <a:endParaRPr kumimoji="1" lang="ja-JP" altLang="en-US" dirty="0"/>
+            <a:endParaRPr kumimoji="1" lang="ja-JP" altLang="en-US"/>
           </a:p>
         </p:txBody>
       </p:sp>
@@ -5833,10 +5835,10 @@
           <a:p>
             <a:pPr algn="ctr"/>
             <a:r>
-              <a:rPr kumimoji="1" lang="en-US" altLang="ja-JP" dirty="0"/>
+              <a:rPr kumimoji="1" lang="en-US" altLang="ja-JP"/>
               <a:t>Serializer</a:t>
             </a:r>
-            <a:endParaRPr kumimoji="1" lang="ja-JP" altLang="en-US" dirty="0"/>
+            <a:endParaRPr kumimoji="1" lang="ja-JP" altLang="en-US"/>
           </a:p>
         </p:txBody>
       </p:sp>
@@ -5885,10 +5887,10 @@
           <a:p>
             <a:pPr algn="ctr"/>
             <a:r>
-              <a:rPr kumimoji="1" lang="en-US" altLang="ja-JP" dirty="0" err="1"/>
+              <a:rPr kumimoji="1" lang="en-US" altLang="ja-JP" err="1"/>
               <a:t>SnippedSerializer</a:t>
             </a:r>
-            <a:endParaRPr kumimoji="1" lang="ja-JP" altLang="en-US" dirty="0"/>
+            <a:endParaRPr kumimoji="1" lang="ja-JP" altLang="en-US"/>
           </a:p>
         </p:txBody>
       </p:sp>
@@ -5977,10 +5979,10 @@
           <a:lstStyle/>
           <a:p>
             <a:r>
-              <a:rPr kumimoji="1" lang="en-US" altLang="ja-JP" dirty="0" err="1"/>
+              <a:rPr kumimoji="1" lang="en-US" altLang="ja-JP" err="1"/>
               <a:t>app.models</a:t>
             </a:r>
-            <a:endParaRPr kumimoji="1" lang="ja-JP" altLang="en-US" dirty="0"/>
+            <a:endParaRPr kumimoji="1" lang="ja-JP" altLang="en-US"/>
           </a:p>
         </p:txBody>
       </p:sp>
@@ -6029,10 +6031,10 @@
           <a:p>
             <a:pPr algn="ctr"/>
             <a:r>
-              <a:rPr kumimoji="1" lang="en-US" altLang="ja-JP" dirty="0"/>
+              <a:rPr kumimoji="1" lang="en-US" altLang="ja-JP"/>
               <a:t>Snipped</a:t>
             </a:r>
-            <a:endParaRPr kumimoji="1" lang="ja-JP" altLang="en-US" dirty="0"/>
+            <a:endParaRPr kumimoji="1" lang="ja-JP" altLang="en-US"/>
           </a:p>
         </p:txBody>
       </p:sp>
@@ -6078,7 +6080,7 @@
           <a:p>
             <a:pPr algn="ctr"/>
             <a:r>
-              <a:rPr kumimoji="1" lang="en-US" altLang="ja-JP" dirty="0" err="1">
+              <a:rPr kumimoji="1" lang="en-US" altLang="ja-JP" err="1">
                 <a:solidFill>
                   <a:schemeClr val="accent1">
                     <a:lumMod val="75000"/>
@@ -6087,7 +6089,7 @@
               </a:rPr>
               <a:t>snipped_instance</a:t>
             </a:r>
-            <a:endParaRPr kumimoji="1" lang="ja-JP" altLang="en-US" dirty="0">
+            <a:endParaRPr kumimoji="1" lang="ja-JP" altLang="en-US">
               <a:solidFill>
                 <a:schemeClr val="accent1">
                   <a:lumMod val="75000"/>
@@ -6139,7 +6141,7 @@
           <a:p>
             <a:pPr algn="ctr"/>
             <a:r>
-              <a:rPr kumimoji="1" lang="en-US" altLang="ja-JP" dirty="0" err="1">
+              <a:rPr kumimoji="1" lang="en-US" altLang="ja-JP" err="1">
                 <a:solidFill>
                   <a:schemeClr val="accent1">
                     <a:lumMod val="75000"/>
@@ -6148,7 +6150,7 @@
               </a:rPr>
               <a:t>snipped_instance</a:t>
             </a:r>
-            <a:endParaRPr kumimoji="1" lang="ja-JP" altLang="en-US" dirty="0">
+            <a:endParaRPr kumimoji="1" lang="ja-JP" altLang="en-US">
               <a:solidFill>
                 <a:schemeClr val="accent1">
                   <a:lumMod val="75000"/>
@@ -6200,7 +6202,7 @@
           <a:p>
             <a:pPr algn="ctr"/>
             <a:r>
-              <a:rPr kumimoji="1" lang="en-US" altLang="ja-JP" dirty="0" err="1">
+              <a:rPr kumimoji="1" lang="en-US" altLang="ja-JP" err="1">
                 <a:solidFill>
                   <a:schemeClr val="accent1">
                     <a:lumMod val="75000"/>
@@ -6209,7 +6211,7 @@
               </a:rPr>
               <a:t>snippet_serializer</a:t>
             </a:r>
-            <a:endParaRPr kumimoji="1" lang="en-US" altLang="ja-JP" dirty="0">
+            <a:endParaRPr kumimoji="1" lang="en-US" altLang="ja-JP">
               <a:solidFill>
                 <a:schemeClr val="accent1">
                   <a:lumMod val="75000"/>
@@ -6220,7 +6222,7 @@
           <a:p>
             <a:pPr algn="ctr"/>
             <a:r>
-              <a:rPr kumimoji="1" lang="en-US" altLang="ja-JP" sz="1200" dirty="0" err="1">
+              <a:rPr kumimoji="1" lang="en-US" altLang="ja-JP" sz="1200" err="1">
                 <a:solidFill>
                   <a:schemeClr val="accent1">
                     <a:lumMod val="75000"/>
@@ -6230,7 +6232,7 @@
               <a:t>SnippedSeiralizer</a:t>
             </a:r>
             <a:r>
-              <a:rPr kumimoji="1" lang="en-US" altLang="ja-JP" sz="1200" dirty="0">
+              <a:rPr kumimoji="1" lang="en-US" altLang="ja-JP" sz="1200">
                 <a:solidFill>
                   <a:schemeClr val="accent1">
                     <a:lumMod val="75000"/>
@@ -6240,7 +6242,7 @@
               <a:t>(</a:t>
             </a:r>
             <a:r>
-              <a:rPr kumimoji="1" lang="en-US" altLang="ja-JP" sz="1200" dirty="0" err="1">
+              <a:rPr kumimoji="1" lang="en-US" altLang="ja-JP" sz="1200" err="1">
                 <a:solidFill>
                   <a:schemeClr val="accent1">
                     <a:lumMod val="75000"/>
@@ -6250,7 +6252,7 @@
               <a:t>snipped_instance</a:t>
             </a:r>
             <a:r>
-              <a:rPr kumimoji="1" lang="en-US" altLang="ja-JP" sz="1200" dirty="0">
+              <a:rPr kumimoji="1" lang="en-US" altLang="ja-JP" sz="1200">
                 <a:solidFill>
                   <a:schemeClr val="accent1">
                     <a:lumMod val="75000"/>
@@ -6396,10 +6398,10 @@
           <a:lstStyle/>
           <a:p>
             <a:r>
-              <a:rPr kumimoji="1" lang="en-US" altLang="ja-JP" dirty="0" err="1"/>
+              <a:rPr kumimoji="1" lang="en-US" altLang="ja-JP" err="1"/>
               <a:t>rest_framework.renderers</a:t>
             </a:r>
-            <a:endParaRPr kumimoji="1" lang="ja-JP" altLang="en-US" dirty="0"/>
+            <a:endParaRPr kumimoji="1" lang="ja-JP" altLang="en-US"/>
           </a:p>
         </p:txBody>
       </p:sp>
@@ -6445,10 +6447,10 @@
           <a:lstStyle/>
           <a:p>
             <a:r>
-              <a:rPr kumimoji="1" lang="en-US" altLang="ja-JP" dirty="0" err="1"/>
+              <a:rPr kumimoji="1" lang="en-US" altLang="ja-JP" err="1"/>
               <a:t>rest_framework.parsers</a:t>
             </a:r>
-            <a:endParaRPr kumimoji="1" lang="ja-JP" altLang="en-US" dirty="0"/>
+            <a:endParaRPr kumimoji="1" lang="ja-JP" altLang="en-US"/>
           </a:p>
         </p:txBody>
       </p:sp>
@@ -6497,18 +6499,18 @@
           <a:p>
             <a:pPr algn="ctr"/>
             <a:r>
-              <a:rPr kumimoji="1" lang="en-US" altLang="ja-JP" dirty="0" err="1"/>
+              <a:rPr kumimoji="1" lang="en-US" altLang="ja-JP" err="1"/>
               <a:t>JSONRenderer</a:t>
             </a:r>
-            <a:endParaRPr kumimoji="1" lang="en-US" altLang="ja-JP" dirty="0"/>
+            <a:endParaRPr kumimoji="1" lang="en-US" altLang="ja-JP"/>
           </a:p>
           <a:p>
             <a:pPr algn="ctr"/>
             <a:r>
-              <a:rPr kumimoji="1" lang="en-US" altLang="ja-JP" dirty="0"/>
+              <a:rPr kumimoji="1" lang="en-US" altLang="ja-JP"/>
               <a:t>render</a:t>
             </a:r>
-            <a:endParaRPr kumimoji="1" lang="ja-JP" altLang="en-US" dirty="0"/>
+            <a:endParaRPr kumimoji="1" lang="ja-JP" altLang="en-US"/>
           </a:p>
         </p:txBody>
       </p:sp>
@@ -6557,18 +6559,18 @@
           <a:p>
             <a:pPr algn="ctr"/>
             <a:r>
-              <a:rPr kumimoji="1" lang="en-US" altLang="ja-JP" dirty="0" err="1"/>
+              <a:rPr kumimoji="1" lang="en-US" altLang="ja-JP" err="1"/>
               <a:t>JSONParser</a:t>
             </a:r>
-            <a:endParaRPr kumimoji="1" lang="en-US" altLang="ja-JP" dirty="0"/>
+            <a:endParaRPr kumimoji="1" lang="en-US" altLang="ja-JP"/>
           </a:p>
           <a:p>
             <a:pPr algn="ctr"/>
             <a:r>
-              <a:rPr kumimoji="1" lang="en-US" altLang="ja-JP" dirty="0"/>
+              <a:rPr kumimoji="1" lang="en-US" altLang="ja-JP"/>
               <a:t>parse</a:t>
             </a:r>
-            <a:endParaRPr kumimoji="1" lang="ja-JP" altLang="en-US" dirty="0"/>
+            <a:endParaRPr kumimoji="1" lang="ja-JP" altLang="en-US"/>
           </a:p>
         </p:txBody>
       </p:sp>
@@ -6660,7 +6662,7 @@
           <a:p>
             <a:pPr algn="ctr"/>
             <a:r>
-              <a:rPr kumimoji="1" lang="en-US" altLang="ja-JP" dirty="0" err="1">
+              <a:rPr kumimoji="1" lang="en-US" altLang="ja-JP" err="1">
                 <a:solidFill>
                   <a:schemeClr val="accent1">
                     <a:lumMod val="75000"/>
@@ -6669,7 +6671,7 @@
               </a:rPr>
               <a:t>snippet_serializer.data</a:t>
             </a:r>
-            <a:endParaRPr kumimoji="1" lang="en-US" altLang="ja-JP" dirty="0">
+            <a:endParaRPr kumimoji="1" lang="en-US" altLang="ja-JP">
               <a:solidFill>
                 <a:schemeClr val="accent1">
                   <a:lumMod val="75000"/>
@@ -6767,7 +6769,7 @@
           <a:p>
             <a:pPr algn="ctr"/>
             <a:r>
-              <a:rPr kumimoji="1" lang="en-US" altLang="ja-JP" dirty="0" err="1">
+              <a:rPr kumimoji="1" lang="en-US" altLang="ja-JP" err="1">
                 <a:solidFill>
                   <a:schemeClr val="accent1">
                     <a:lumMod val="75000"/>
@@ -6776,7 +6778,7 @@
               </a:rPr>
               <a:t>json_contents</a:t>
             </a:r>
-            <a:endParaRPr kumimoji="1" lang="en-US" altLang="ja-JP" dirty="0">
+            <a:endParaRPr kumimoji="1" lang="en-US" altLang="ja-JP">
               <a:solidFill>
                 <a:schemeClr val="accent1">
                   <a:lumMod val="75000"/>
@@ -6787,7 +6789,7 @@
           <a:p>
             <a:pPr algn="ctr"/>
             <a:r>
-              <a:rPr kumimoji="1" lang="en-US" altLang="ja-JP" dirty="0">
+              <a:rPr kumimoji="1" lang="en-US" altLang="ja-JP">
                 <a:solidFill>
                   <a:schemeClr val="accent1">
                     <a:lumMod val="75000"/>
@@ -6797,7 +6799,7 @@
               <a:t>(</a:t>
             </a:r>
             <a:r>
-              <a:rPr kumimoji="1" lang="en-US" altLang="ja-JP" dirty="0" err="1">
+              <a:rPr kumimoji="1" lang="en-US" altLang="ja-JP" err="1">
                 <a:solidFill>
                   <a:schemeClr val="accent1">
                     <a:lumMod val="75000"/>
@@ -6807,7 +6809,7 @@
               <a:t>snipped_serializer.data</a:t>
             </a:r>
             <a:r>
-              <a:rPr kumimoji="1" lang="en-US" altLang="ja-JP" dirty="0">
+              <a:rPr kumimoji="1" lang="en-US" altLang="ja-JP">
                 <a:solidFill>
                   <a:schemeClr val="accent1">
                     <a:lumMod val="75000"/>
@@ -6907,10 +6909,10 @@
           <a:lstStyle/>
           <a:p>
             <a:r>
-              <a:rPr kumimoji="1" lang="en-US" altLang="ja-JP" dirty="0" err="1"/>
+              <a:rPr kumimoji="1" lang="en-US" altLang="ja-JP" err="1"/>
               <a:t>io.BytesIO</a:t>
             </a:r>
-            <a:endParaRPr kumimoji="1" lang="ja-JP" altLang="en-US" dirty="0"/>
+            <a:endParaRPr kumimoji="1" lang="ja-JP" altLang="en-US"/>
           </a:p>
         </p:txBody>
       </p:sp>
@@ -6960,10 +6962,2023 @@
           </a:p>
         </p:txBody>
       </p:sp>
+      <p:sp>
+        <p:nvSpPr>
+          <p:cNvPr id="2" name="テキスト ボックス 1">
+            <a:extLst>
+              <a:ext uri="{FF2B5EF4-FFF2-40B4-BE49-F238E27FC236}">
+                <a16:creationId xmlns:a16="http://schemas.microsoft.com/office/drawing/2014/main" id="{125E0325-A83E-4918-9D95-9902B20B6F90}"/>
+              </a:ext>
+            </a:extLst>
+          </p:cNvPr>
+          <p:cNvSpPr txBox="1"/>
+          <p:nvPr/>
+        </p:nvSpPr>
+        <p:spPr>
+          <a:xfrm>
+            <a:off x="343949" y="369116"/>
+            <a:ext cx="2715616" cy="369332"/>
+          </a:xfrm>
+          <a:prstGeom prst="rect">
+            <a:avLst/>
+          </a:prstGeom>
+          <a:noFill/>
+        </p:spPr>
+        <p:txBody>
+          <a:bodyPr wrap="square" rtlCol="0">
+            <a:spAutoFit/>
+          </a:bodyPr>
+          <a:lstStyle/>
+          <a:p>
+            <a:r>
+              <a:rPr kumimoji="1" lang="en-US" altLang="ja-JP"/>
+              <a:t>Serializer</a:t>
+            </a:r>
+            <a:r>
+              <a:rPr kumimoji="1" lang="ja-JP" altLang="en-US"/>
+              <a:t>の関係</a:t>
+            </a:r>
+          </a:p>
+        </p:txBody>
+      </p:sp>
     </p:spTree>
     <p:extLst>
       <p:ext uri="{BB962C8B-B14F-4D97-AF65-F5344CB8AC3E}">
         <p14:creationId xmlns:p14="http://schemas.microsoft.com/office/powerpoint/2010/main" val="2324830585"/>
+      </p:ext>
+    </p:extLst>
+  </p:cSld>
+  <p:clrMapOvr>
+    <a:masterClrMapping/>
+  </p:clrMapOvr>
+</p:sld>
+</file>
+
+<file path=ppt/slides/slide3.xml><?xml version="1.0" encoding="utf-8"?>
+<p:sld xmlns:a="http://schemas.openxmlformats.org/drawingml/2006/main" xmlns:r="http://schemas.openxmlformats.org/officeDocument/2006/relationships" xmlns:p="http://schemas.openxmlformats.org/presentationml/2006/main">
+  <p:cSld>
+    <p:spTree>
+      <p:nvGrpSpPr>
+        <p:cNvPr id="1" name=""/>
+        <p:cNvGrpSpPr/>
+        <p:nvPr/>
+      </p:nvGrpSpPr>
+      <p:grpSpPr>
+        <a:xfrm>
+          <a:off x="0" y="0"/>
+          <a:ext cx="0" cy="0"/>
+          <a:chOff x="0" y="0"/>
+          <a:chExt cx="0" cy="0"/>
+        </a:xfrm>
+      </p:grpSpPr>
+      <p:cxnSp>
+        <p:nvCxnSpPr>
+          <p:cNvPr id="39" name="コネクタ: カギ線 38">
+            <a:extLst>
+              <a:ext uri="{FF2B5EF4-FFF2-40B4-BE49-F238E27FC236}">
+                <a16:creationId xmlns:a16="http://schemas.microsoft.com/office/drawing/2014/main" id="{9EBCC000-21A2-4EAE-AC14-2DAF7209912D}"/>
+              </a:ext>
+            </a:extLst>
+          </p:cNvPr>
+          <p:cNvCxnSpPr>
+            <a:cxnSpLocks/>
+            <a:stCxn id="23" idx="2"/>
+            <a:endCxn id="29" idx="0"/>
+          </p:cNvCxnSpPr>
+          <p:nvPr/>
+        </p:nvCxnSpPr>
+        <p:spPr>
+          <a:xfrm rot="5400000">
+            <a:off x="6072817" y="-735026"/>
+            <a:ext cx="2944008" cy="6444725"/>
+          </a:xfrm>
+          <a:prstGeom prst="bentConnector3">
+            <a:avLst>
+              <a:gd name="adj1" fmla="val 57118"/>
+            </a:avLst>
+          </a:prstGeom>
+          <a:ln w="19050">
+            <a:prstDash val="dash"/>
+            <a:tailEnd type="triangle"/>
+          </a:ln>
+        </p:spPr>
+        <p:style>
+          <a:lnRef idx="3">
+            <a:schemeClr val="accent2"/>
+          </a:lnRef>
+          <a:fillRef idx="0">
+            <a:schemeClr val="accent2"/>
+          </a:fillRef>
+          <a:effectRef idx="2">
+            <a:schemeClr val="accent2"/>
+          </a:effectRef>
+          <a:fontRef idx="minor">
+            <a:schemeClr val="tx1"/>
+          </a:fontRef>
+        </p:style>
+      </p:cxnSp>
+      <p:sp>
+        <p:nvSpPr>
+          <p:cNvPr id="4" name="テキスト ボックス 3">
+            <a:extLst>
+              <a:ext uri="{FF2B5EF4-FFF2-40B4-BE49-F238E27FC236}">
+                <a16:creationId xmlns:a16="http://schemas.microsoft.com/office/drawing/2014/main" id="{5D941BA7-80CF-44E8-A3C8-C9915B27A17A}"/>
+              </a:ext>
+            </a:extLst>
+          </p:cNvPr>
+          <p:cNvSpPr txBox="1"/>
+          <p:nvPr/>
+        </p:nvSpPr>
+        <p:spPr>
+          <a:xfrm>
+            <a:off x="343949" y="6277417"/>
+            <a:ext cx="2601298" cy="369332"/>
+          </a:xfrm>
+          <a:prstGeom prst="rect">
+            <a:avLst/>
+          </a:prstGeom>
+          <a:noFill/>
+        </p:spPr>
+        <p:txBody>
+          <a:bodyPr wrap="square" rtlCol="0">
+            <a:spAutoFit/>
+          </a:bodyPr>
+          <a:lstStyle/>
+          <a:p>
+            <a:r>
+              <a:rPr kumimoji="1" lang="ja-JP" altLang="en-US" dirty="0"/>
+              <a:t>認証とパーミッション</a:t>
+            </a:r>
+          </a:p>
+        </p:txBody>
+      </p:sp>
+      <p:sp>
+        <p:nvSpPr>
+          <p:cNvPr id="5" name="正方形/長方形 4">
+            <a:extLst>
+              <a:ext uri="{FF2B5EF4-FFF2-40B4-BE49-F238E27FC236}">
+                <a16:creationId xmlns:a16="http://schemas.microsoft.com/office/drawing/2014/main" id="{3EA3F01D-7981-493E-AB21-A93611410C68}"/>
+              </a:ext>
+            </a:extLst>
+          </p:cNvPr>
+          <p:cNvSpPr/>
+          <p:nvPr/>
+        </p:nvSpPr>
+        <p:spPr>
+          <a:xfrm>
+            <a:off x="367908" y="452698"/>
+            <a:ext cx="2525785" cy="939568"/>
+          </a:xfrm>
+          <a:prstGeom prst="rect">
+            <a:avLst/>
+          </a:prstGeom>
+        </p:spPr>
+        <p:style>
+          <a:lnRef idx="2">
+            <a:schemeClr val="accent1"/>
+          </a:lnRef>
+          <a:fillRef idx="1">
+            <a:schemeClr val="lt1"/>
+          </a:fillRef>
+          <a:effectRef idx="0">
+            <a:schemeClr val="accent1"/>
+          </a:effectRef>
+          <a:fontRef idx="minor">
+            <a:schemeClr val="dk1"/>
+          </a:fontRef>
+        </p:style>
+        <p:txBody>
+          <a:bodyPr rtlCol="0" anchor="ctr"/>
+          <a:lstStyle/>
+          <a:p>
+            <a:pPr algn="ctr"/>
+            <a:r>
+              <a:rPr kumimoji="1" lang="en-US" altLang="ja-JP" sz="1400"/>
+              <a:t>Snippet</a:t>
+            </a:r>
+            <a:endParaRPr kumimoji="1" lang="ja-JP" altLang="en-US" sz="1400"/>
+          </a:p>
+        </p:txBody>
+      </p:sp>
+      <p:sp>
+        <p:nvSpPr>
+          <p:cNvPr id="6" name="正方形/長方形 5">
+            <a:extLst>
+              <a:ext uri="{FF2B5EF4-FFF2-40B4-BE49-F238E27FC236}">
+                <a16:creationId xmlns:a16="http://schemas.microsoft.com/office/drawing/2014/main" id="{8BF08FEA-9857-4EF5-8F55-C55F4B5D2604}"/>
+              </a:ext>
+            </a:extLst>
+          </p:cNvPr>
+          <p:cNvSpPr/>
+          <p:nvPr/>
+        </p:nvSpPr>
+        <p:spPr>
+          <a:xfrm>
+            <a:off x="367908" y="83366"/>
+            <a:ext cx="2525785" cy="276837"/>
+          </a:xfrm>
+          <a:prstGeom prst="rect">
+            <a:avLst/>
+          </a:prstGeom>
+        </p:spPr>
+        <p:style>
+          <a:lnRef idx="2">
+            <a:schemeClr val="accent1"/>
+          </a:lnRef>
+          <a:fillRef idx="1">
+            <a:schemeClr val="lt1"/>
+          </a:fillRef>
+          <a:effectRef idx="0">
+            <a:schemeClr val="accent1"/>
+          </a:effectRef>
+          <a:fontRef idx="minor">
+            <a:schemeClr val="dk1"/>
+          </a:fontRef>
+        </p:style>
+        <p:txBody>
+          <a:bodyPr rtlCol="0" anchor="ctr"/>
+          <a:lstStyle/>
+          <a:p>
+            <a:pPr algn="ctr"/>
+            <a:r>
+              <a:rPr kumimoji="1" lang="en-US" altLang="ja-JP" sz="1400"/>
+              <a:t>models.py</a:t>
+            </a:r>
+            <a:endParaRPr kumimoji="1" lang="ja-JP" altLang="en-US" sz="1400"/>
+          </a:p>
+        </p:txBody>
+      </p:sp>
+      <p:sp>
+        <p:nvSpPr>
+          <p:cNvPr id="7" name="正方形/長方形 6">
+            <a:extLst>
+              <a:ext uri="{FF2B5EF4-FFF2-40B4-BE49-F238E27FC236}">
+                <a16:creationId xmlns:a16="http://schemas.microsoft.com/office/drawing/2014/main" id="{86D0B0A9-6C4C-49A6-8DE7-1557DC235391}"/>
+              </a:ext>
+            </a:extLst>
+          </p:cNvPr>
+          <p:cNvSpPr/>
+          <p:nvPr/>
+        </p:nvSpPr>
+        <p:spPr>
+          <a:xfrm>
+            <a:off x="3083524" y="452699"/>
+            <a:ext cx="2525785" cy="939568"/>
+          </a:xfrm>
+          <a:prstGeom prst="rect">
+            <a:avLst/>
+          </a:prstGeom>
+        </p:spPr>
+        <p:style>
+          <a:lnRef idx="2">
+            <a:schemeClr val="accent1"/>
+          </a:lnRef>
+          <a:fillRef idx="1">
+            <a:schemeClr val="lt1"/>
+          </a:fillRef>
+          <a:effectRef idx="0">
+            <a:schemeClr val="accent1"/>
+          </a:effectRef>
+          <a:fontRef idx="minor">
+            <a:schemeClr val="dk1"/>
+          </a:fontRef>
+        </p:style>
+        <p:txBody>
+          <a:bodyPr rtlCol="0" anchor="ctr"/>
+          <a:lstStyle/>
+          <a:p>
+            <a:pPr algn="ctr"/>
+            <a:r>
+              <a:rPr kumimoji="1" lang="en-US" altLang="ja-JP" sz="1400" err="1"/>
+              <a:t>SnippetSerializer</a:t>
+            </a:r>
+            <a:endParaRPr kumimoji="1" lang="ja-JP" altLang="en-US" sz="1400"/>
+          </a:p>
+        </p:txBody>
+      </p:sp>
+      <p:sp>
+        <p:nvSpPr>
+          <p:cNvPr id="8" name="正方形/長方形 7">
+            <a:extLst>
+              <a:ext uri="{FF2B5EF4-FFF2-40B4-BE49-F238E27FC236}">
+                <a16:creationId xmlns:a16="http://schemas.microsoft.com/office/drawing/2014/main" id="{8E7F112D-0859-4B50-AA37-C2EB8CDB88F2}"/>
+              </a:ext>
+            </a:extLst>
+          </p:cNvPr>
+          <p:cNvSpPr/>
+          <p:nvPr/>
+        </p:nvSpPr>
+        <p:spPr>
+          <a:xfrm>
+            <a:off x="3083524" y="83366"/>
+            <a:ext cx="5458874" cy="276837"/>
+          </a:xfrm>
+          <a:prstGeom prst="rect">
+            <a:avLst/>
+          </a:prstGeom>
+        </p:spPr>
+        <p:style>
+          <a:lnRef idx="2">
+            <a:schemeClr val="accent1"/>
+          </a:lnRef>
+          <a:fillRef idx="1">
+            <a:schemeClr val="lt1"/>
+          </a:fillRef>
+          <a:effectRef idx="0">
+            <a:schemeClr val="accent1"/>
+          </a:effectRef>
+          <a:fontRef idx="minor">
+            <a:schemeClr val="dk1"/>
+          </a:fontRef>
+        </p:style>
+        <p:txBody>
+          <a:bodyPr rtlCol="0" anchor="ctr"/>
+          <a:lstStyle/>
+          <a:p>
+            <a:pPr algn="ctr"/>
+            <a:r>
+              <a:rPr kumimoji="1" lang="en-US" altLang="ja-JP" sz="1400"/>
+              <a:t>serializers.py</a:t>
+            </a:r>
+            <a:endParaRPr kumimoji="1" lang="ja-JP" altLang="en-US" sz="1400"/>
+          </a:p>
+        </p:txBody>
+      </p:sp>
+      <p:sp>
+        <p:nvSpPr>
+          <p:cNvPr id="9" name="正方形/長方形 8">
+            <a:extLst>
+              <a:ext uri="{FF2B5EF4-FFF2-40B4-BE49-F238E27FC236}">
+                <a16:creationId xmlns:a16="http://schemas.microsoft.com/office/drawing/2014/main" id="{76131079-057F-4FAA-989E-CECBECBE26A6}"/>
+              </a:ext>
+            </a:extLst>
+          </p:cNvPr>
+          <p:cNvSpPr/>
+          <p:nvPr/>
+        </p:nvSpPr>
+        <p:spPr>
+          <a:xfrm>
+            <a:off x="6016613" y="452699"/>
+            <a:ext cx="2525785" cy="939568"/>
+          </a:xfrm>
+          <a:prstGeom prst="rect">
+            <a:avLst/>
+          </a:prstGeom>
+        </p:spPr>
+        <p:style>
+          <a:lnRef idx="2">
+            <a:schemeClr val="accent1"/>
+          </a:lnRef>
+          <a:fillRef idx="1">
+            <a:schemeClr val="lt1"/>
+          </a:fillRef>
+          <a:effectRef idx="0">
+            <a:schemeClr val="accent1"/>
+          </a:effectRef>
+          <a:fontRef idx="minor">
+            <a:schemeClr val="dk1"/>
+          </a:fontRef>
+        </p:style>
+        <p:txBody>
+          <a:bodyPr rtlCol="0" anchor="ctr"/>
+          <a:lstStyle/>
+          <a:p>
+            <a:pPr algn="ctr"/>
+            <a:r>
+              <a:rPr kumimoji="1" lang="en-US" altLang="ja-JP" sz="1400" err="1"/>
+              <a:t>UserSerializer</a:t>
+            </a:r>
+            <a:endParaRPr kumimoji="1" lang="ja-JP" altLang="en-US" sz="1400"/>
+          </a:p>
+        </p:txBody>
+      </p:sp>
+      <p:sp>
+        <p:nvSpPr>
+          <p:cNvPr id="10" name="正方形/長方形 9">
+            <a:extLst>
+              <a:ext uri="{FF2B5EF4-FFF2-40B4-BE49-F238E27FC236}">
+                <a16:creationId xmlns:a16="http://schemas.microsoft.com/office/drawing/2014/main" id="{BB4B72D7-A31D-4D3E-98DF-5AE33223BDFB}"/>
+              </a:ext>
+            </a:extLst>
+          </p:cNvPr>
+          <p:cNvSpPr/>
+          <p:nvPr/>
+        </p:nvSpPr>
+        <p:spPr>
+          <a:xfrm>
+            <a:off x="367908" y="4689180"/>
+            <a:ext cx="2525785" cy="939568"/>
+          </a:xfrm>
+          <a:prstGeom prst="rect">
+            <a:avLst/>
+          </a:prstGeom>
+        </p:spPr>
+        <p:style>
+          <a:lnRef idx="2">
+            <a:schemeClr val="accent1"/>
+          </a:lnRef>
+          <a:fillRef idx="1">
+            <a:schemeClr val="lt1"/>
+          </a:fillRef>
+          <a:effectRef idx="0">
+            <a:schemeClr val="accent1"/>
+          </a:effectRef>
+          <a:fontRef idx="minor">
+            <a:schemeClr val="dk1"/>
+          </a:fontRef>
+        </p:style>
+        <p:txBody>
+          <a:bodyPr rtlCol="0" anchor="ctr"/>
+          <a:lstStyle/>
+          <a:p>
+            <a:pPr algn="ctr"/>
+            <a:r>
+              <a:rPr kumimoji="1" lang="en-US" altLang="ja-JP" sz="1400" dirty="0"/>
+              <a:t>User</a:t>
+            </a:r>
+          </a:p>
+        </p:txBody>
+      </p:sp>
+      <p:sp>
+        <p:nvSpPr>
+          <p:cNvPr id="13" name="正方形/長方形 12">
+            <a:extLst>
+              <a:ext uri="{FF2B5EF4-FFF2-40B4-BE49-F238E27FC236}">
+                <a16:creationId xmlns:a16="http://schemas.microsoft.com/office/drawing/2014/main" id="{E7DDB38E-05EE-4777-905B-A1F61EC71F4A}"/>
+              </a:ext>
+            </a:extLst>
+          </p:cNvPr>
+          <p:cNvSpPr/>
+          <p:nvPr/>
+        </p:nvSpPr>
+        <p:spPr>
+          <a:xfrm>
+            <a:off x="367908" y="5695383"/>
+            <a:ext cx="2525785" cy="276837"/>
+          </a:xfrm>
+          <a:prstGeom prst="rect">
+            <a:avLst/>
+          </a:prstGeom>
+        </p:spPr>
+        <p:style>
+          <a:lnRef idx="2">
+            <a:schemeClr val="accent1"/>
+          </a:lnRef>
+          <a:fillRef idx="1">
+            <a:schemeClr val="lt1"/>
+          </a:fillRef>
+          <a:effectRef idx="0">
+            <a:schemeClr val="accent1"/>
+          </a:effectRef>
+          <a:fontRef idx="minor">
+            <a:schemeClr val="dk1"/>
+          </a:fontRef>
+        </p:style>
+        <p:txBody>
+          <a:bodyPr rtlCol="0" anchor="ctr"/>
+          <a:lstStyle/>
+          <a:p>
+            <a:pPr algn="ctr"/>
+            <a:r>
+              <a:rPr kumimoji="1" lang="en-US" altLang="ja-JP" sz="1400" dirty="0" err="1"/>
+              <a:t>django.contrib.auth.models</a:t>
+            </a:r>
+            <a:endParaRPr kumimoji="1" lang="en-US" altLang="ja-JP" sz="1400" dirty="0"/>
+          </a:p>
+        </p:txBody>
+      </p:sp>
+      <p:sp>
+        <p:nvSpPr>
+          <p:cNvPr id="14" name="正方形/長方形 13">
+            <a:extLst>
+              <a:ext uri="{FF2B5EF4-FFF2-40B4-BE49-F238E27FC236}">
+                <a16:creationId xmlns:a16="http://schemas.microsoft.com/office/drawing/2014/main" id="{85D116F6-5D52-4309-AAEB-13C000850D56}"/>
+              </a:ext>
+            </a:extLst>
+          </p:cNvPr>
+          <p:cNvSpPr/>
+          <p:nvPr/>
+        </p:nvSpPr>
+        <p:spPr>
+          <a:xfrm>
+            <a:off x="367908" y="1446705"/>
+            <a:ext cx="2525785" cy="793813"/>
+          </a:xfrm>
+          <a:prstGeom prst="rect">
+            <a:avLst/>
+          </a:prstGeom>
+        </p:spPr>
+        <p:style>
+          <a:lnRef idx="2">
+            <a:schemeClr val="accent1"/>
+          </a:lnRef>
+          <a:fillRef idx="1">
+            <a:schemeClr val="lt1"/>
+          </a:fillRef>
+          <a:effectRef idx="0">
+            <a:schemeClr val="accent1"/>
+          </a:effectRef>
+          <a:fontRef idx="minor">
+            <a:schemeClr val="dk1"/>
+          </a:fontRef>
+        </p:style>
+        <p:txBody>
+          <a:bodyPr rtlCol="0" anchor="ctr"/>
+          <a:lstStyle/>
+          <a:p>
+            <a:r>
+              <a:rPr kumimoji="1" lang="en-US" altLang="ja-JP" sz="1400" dirty="0"/>
+              <a:t>fields:</a:t>
+            </a:r>
+          </a:p>
+          <a:p>
+            <a:r>
+              <a:rPr kumimoji="1" lang="en-US" altLang="ja-JP" sz="1400" dirty="0"/>
+              <a:t>* owner</a:t>
+            </a:r>
+          </a:p>
+          <a:p>
+            <a:r>
+              <a:rPr kumimoji="1" lang="en-US" altLang="ja-JP" sz="800" dirty="0" err="1"/>
+              <a:t>ForeignKey</a:t>
+            </a:r>
+            <a:r>
+              <a:rPr kumimoji="1" lang="en-US" altLang="ja-JP" sz="800" dirty="0"/>
+              <a:t>(“</a:t>
+            </a:r>
+            <a:r>
+              <a:rPr kumimoji="1" lang="en-US" altLang="ja-JP" sz="800" dirty="0" err="1"/>
+              <a:t>auth.User</a:t>
+            </a:r>
+            <a:r>
+              <a:rPr kumimoji="1" lang="en-US" altLang="ja-JP" sz="800" dirty="0"/>
+              <a:t>”, </a:t>
+            </a:r>
+            <a:r>
+              <a:rPr kumimoji="1" lang="en-US" altLang="ja-JP" sz="800" dirty="0" err="1"/>
+              <a:t>related_name</a:t>
+            </a:r>
+            <a:r>
+              <a:rPr kumimoji="1" lang="en-US" altLang="ja-JP" sz="800" dirty="0"/>
+              <a:t>=“snippets”, </a:t>
+            </a:r>
+            <a:r>
+              <a:rPr kumimoji="1" lang="en-US" altLang="ja-JP" sz="800" dirty="0" err="1"/>
+              <a:t>on_delete</a:t>
+            </a:r>
+            <a:r>
+              <a:rPr kumimoji="1" lang="en-US" altLang="ja-JP" sz="800" dirty="0"/>
+              <a:t>=</a:t>
+            </a:r>
+            <a:r>
+              <a:rPr kumimoji="1" lang="en-US" altLang="ja-JP" sz="800" dirty="0" err="1"/>
+              <a:t>models.CASCADE</a:t>
+            </a:r>
+            <a:r>
+              <a:rPr kumimoji="1" lang="en-US" altLang="ja-JP" sz="800" dirty="0"/>
+              <a:t>)</a:t>
+            </a:r>
+            <a:endParaRPr kumimoji="1" lang="ja-JP" altLang="en-US" sz="800" dirty="0"/>
+          </a:p>
+        </p:txBody>
+      </p:sp>
+      <p:cxnSp>
+        <p:nvCxnSpPr>
+          <p:cNvPr id="16" name="コネクタ: カギ線 15">
+            <a:extLst>
+              <a:ext uri="{FF2B5EF4-FFF2-40B4-BE49-F238E27FC236}">
+                <a16:creationId xmlns:a16="http://schemas.microsoft.com/office/drawing/2014/main" id="{9D3309F5-29AE-4C82-B0DE-4ECDB241B78C}"/>
+              </a:ext>
+            </a:extLst>
+          </p:cNvPr>
+          <p:cNvCxnSpPr>
+            <a:cxnSpLocks/>
+            <a:stCxn id="10" idx="1"/>
+            <a:endCxn id="14" idx="1"/>
+          </p:cNvCxnSpPr>
+          <p:nvPr/>
+        </p:nvCxnSpPr>
+        <p:spPr>
+          <a:xfrm rot="10800000">
+            <a:off x="367908" y="1843612"/>
+            <a:ext cx="12700" cy="3315352"/>
+          </a:xfrm>
+          <a:prstGeom prst="bentConnector3">
+            <a:avLst>
+              <a:gd name="adj1" fmla="val 1575000"/>
+            </a:avLst>
+          </a:prstGeom>
+          <a:ln w="19050">
+            <a:tailEnd type="triangle"/>
+          </a:ln>
+        </p:spPr>
+        <p:style>
+          <a:lnRef idx="3">
+            <a:schemeClr val="accent2"/>
+          </a:lnRef>
+          <a:fillRef idx="0">
+            <a:schemeClr val="accent2"/>
+          </a:fillRef>
+          <a:effectRef idx="2">
+            <a:schemeClr val="accent2"/>
+          </a:effectRef>
+          <a:fontRef idx="minor">
+            <a:schemeClr val="tx1"/>
+          </a:fontRef>
+        </p:style>
+      </p:cxnSp>
+      <p:sp>
+        <p:nvSpPr>
+          <p:cNvPr id="18" name="正方形/長方形 17">
+            <a:extLst>
+              <a:ext uri="{FF2B5EF4-FFF2-40B4-BE49-F238E27FC236}">
+                <a16:creationId xmlns:a16="http://schemas.microsoft.com/office/drawing/2014/main" id="{4FD95AB4-BD45-41A3-91FE-FE71DAB82B6B}"/>
+              </a:ext>
+            </a:extLst>
+          </p:cNvPr>
+          <p:cNvSpPr/>
+          <p:nvPr/>
+        </p:nvSpPr>
+        <p:spPr>
+          <a:xfrm>
+            <a:off x="367908" y="2307152"/>
+            <a:ext cx="2525785" cy="1416775"/>
+          </a:xfrm>
+          <a:prstGeom prst="rect">
+            <a:avLst/>
+          </a:prstGeom>
+        </p:spPr>
+        <p:style>
+          <a:lnRef idx="2">
+            <a:schemeClr val="accent1"/>
+          </a:lnRef>
+          <a:fillRef idx="1">
+            <a:schemeClr val="lt1"/>
+          </a:fillRef>
+          <a:effectRef idx="0">
+            <a:schemeClr val="accent1"/>
+          </a:effectRef>
+          <a:fontRef idx="minor">
+            <a:schemeClr val="dk1"/>
+          </a:fontRef>
+        </p:style>
+        <p:txBody>
+          <a:bodyPr rtlCol="0" anchor="ctr"/>
+          <a:lstStyle/>
+          <a:p>
+            <a:r>
+              <a:rPr kumimoji="1" lang="en-US" altLang="ja-JP" sz="1400" dirty="0"/>
+              <a:t>methods</a:t>
+            </a:r>
+          </a:p>
+          <a:p>
+            <a:r>
+              <a:rPr kumimoji="1" lang="en-US" altLang="ja-JP" sz="1400" dirty="0"/>
+              <a:t>* save(self, *</a:t>
+            </a:r>
+            <a:r>
+              <a:rPr kumimoji="1" lang="en-US" altLang="ja-JP" sz="1400" dirty="0" err="1"/>
+              <a:t>args</a:t>
+            </a:r>
+            <a:r>
+              <a:rPr kumimoji="1" lang="en-US" altLang="ja-JP" sz="1400" dirty="0"/>
+              <a:t>, **</a:t>
+            </a:r>
+            <a:r>
+              <a:rPr kumimoji="1" lang="en-US" altLang="ja-JP" sz="1400" dirty="0" err="1"/>
+              <a:t>kwargs</a:t>
+            </a:r>
+            <a:r>
+              <a:rPr kumimoji="1" lang="en-US" altLang="ja-JP" sz="1400" dirty="0"/>
+              <a:t>)</a:t>
+            </a:r>
+          </a:p>
+          <a:p>
+            <a:r>
+              <a:rPr kumimoji="1" lang="en-US" altLang="ja-JP" sz="1050" dirty="0"/>
+              <a:t>-&gt; save</a:t>
+            </a:r>
+            <a:r>
+              <a:rPr kumimoji="1" lang="ja-JP" altLang="en-US" sz="1050" dirty="0"/>
+              <a:t>前のフック処理</a:t>
+            </a:r>
+            <a:endParaRPr kumimoji="1" lang="en-US" altLang="ja-JP" sz="1050" dirty="0"/>
+          </a:p>
+          <a:p>
+            <a:r>
+              <a:rPr kumimoji="1" lang="en-US" altLang="ja-JP" sz="1050" dirty="0"/>
+              <a:t>-&gt; </a:t>
+            </a:r>
+            <a:r>
+              <a:rPr kumimoji="1" lang="ja-JP" altLang="en-US" sz="1050" dirty="0"/>
+              <a:t>スニペットにハイライトを適用した値を格納する</a:t>
+            </a:r>
+            <a:endParaRPr kumimoji="1" lang="en-US" altLang="ja-JP" sz="1050" dirty="0"/>
+          </a:p>
+          <a:p>
+            <a:r>
+              <a:rPr kumimoji="1" lang="en-US" altLang="ja-JP" sz="1050" dirty="0"/>
+              <a:t>-&gt; super(Snippet, self).save(*</a:t>
+            </a:r>
+            <a:r>
+              <a:rPr kumimoji="1" lang="en-US" altLang="ja-JP" sz="1050" dirty="0" err="1"/>
+              <a:t>args</a:t>
+            </a:r>
+            <a:r>
+              <a:rPr kumimoji="1" lang="en-US" altLang="ja-JP" sz="1050" dirty="0"/>
+              <a:t>, **</a:t>
+            </a:r>
+            <a:r>
+              <a:rPr kumimoji="1" lang="en-US" altLang="ja-JP" sz="1050" dirty="0" err="1"/>
+              <a:t>kwargs</a:t>
+            </a:r>
+            <a:r>
+              <a:rPr kumimoji="1" lang="en-US" altLang="ja-JP" sz="1050" dirty="0"/>
+              <a:t>)</a:t>
+            </a:r>
+          </a:p>
+        </p:txBody>
+      </p:sp>
+      <p:sp>
+        <p:nvSpPr>
+          <p:cNvPr id="21" name="正方形/長方形 20">
+            <a:extLst>
+              <a:ext uri="{FF2B5EF4-FFF2-40B4-BE49-F238E27FC236}">
+                <a16:creationId xmlns:a16="http://schemas.microsoft.com/office/drawing/2014/main" id="{2159ACD0-7AD5-4D3E-8039-5B7B8D4B56DB}"/>
+              </a:ext>
+            </a:extLst>
+          </p:cNvPr>
+          <p:cNvSpPr/>
+          <p:nvPr/>
+        </p:nvSpPr>
+        <p:spPr>
+          <a:xfrm>
+            <a:off x="3083524" y="1446705"/>
+            <a:ext cx="2525785" cy="793813"/>
+          </a:xfrm>
+          <a:prstGeom prst="rect">
+            <a:avLst/>
+          </a:prstGeom>
+        </p:spPr>
+        <p:style>
+          <a:lnRef idx="2">
+            <a:schemeClr val="accent1"/>
+          </a:lnRef>
+          <a:fillRef idx="1">
+            <a:schemeClr val="lt1"/>
+          </a:fillRef>
+          <a:effectRef idx="0">
+            <a:schemeClr val="accent1"/>
+          </a:effectRef>
+          <a:fontRef idx="minor">
+            <a:schemeClr val="dk1"/>
+          </a:fontRef>
+        </p:style>
+        <p:txBody>
+          <a:bodyPr rtlCol="0" anchor="ctr"/>
+          <a:lstStyle/>
+          <a:p>
+            <a:r>
+              <a:rPr kumimoji="1" lang="en-US" altLang="ja-JP" sz="1400" dirty="0"/>
+              <a:t>fields:</a:t>
+            </a:r>
+          </a:p>
+          <a:p>
+            <a:r>
+              <a:rPr kumimoji="1" lang="en-US" altLang="ja-JP" sz="1400" dirty="0"/>
+              <a:t>* owner</a:t>
+            </a:r>
+          </a:p>
+          <a:p>
+            <a:r>
+              <a:rPr kumimoji="1" lang="en-US" altLang="ja-JP" sz="800" dirty="0" err="1"/>
+              <a:t>serializers.ReadOnlyField</a:t>
+            </a:r>
+            <a:r>
+              <a:rPr kumimoji="1" lang="en-US" altLang="ja-JP" sz="800" dirty="0"/>
+              <a:t>(source=“</a:t>
+            </a:r>
+            <a:r>
+              <a:rPr kumimoji="1" lang="en-US" altLang="ja-JP" sz="800" dirty="0" err="1"/>
+              <a:t>owner.username</a:t>
+            </a:r>
+            <a:r>
+              <a:rPr kumimoji="1" lang="en-US" altLang="ja-JP" sz="800" dirty="0"/>
+              <a:t>”)</a:t>
+            </a:r>
+            <a:endParaRPr kumimoji="1" lang="ja-JP" altLang="en-US" sz="800" dirty="0"/>
+          </a:p>
+        </p:txBody>
+      </p:sp>
+      <p:sp>
+        <p:nvSpPr>
+          <p:cNvPr id="22" name="正方形/長方形 21">
+            <a:extLst>
+              <a:ext uri="{FF2B5EF4-FFF2-40B4-BE49-F238E27FC236}">
+                <a16:creationId xmlns:a16="http://schemas.microsoft.com/office/drawing/2014/main" id="{ECB5B2E2-31C0-45F2-82CE-EA0B61A23426}"/>
+              </a:ext>
+            </a:extLst>
+          </p:cNvPr>
+          <p:cNvSpPr/>
+          <p:nvPr/>
+        </p:nvSpPr>
+        <p:spPr>
+          <a:xfrm>
+            <a:off x="6016613" y="1446705"/>
+            <a:ext cx="2525785" cy="793813"/>
+          </a:xfrm>
+          <a:prstGeom prst="rect">
+            <a:avLst/>
+          </a:prstGeom>
+        </p:spPr>
+        <p:style>
+          <a:lnRef idx="2">
+            <a:schemeClr val="accent1"/>
+          </a:lnRef>
+          <a:fillRef idx="1">
+            <a:schemeClr val="lt1"/>
+          </a:fillRef>
+          <a:effectRef idx="0">
+            <a:schemeClr val="accent1"/>
+          </a:effectRef>
+          <a:fontRef idx="minor">
+            <a:schemeClr val="dk1"/>
+          </a:fontRef>
+        </p:style>
+        <p:txBody>
+          <a:bodyPr rtlCol="0" anchor="ctr"/>
+          <a:lstStyle/>
+          <a:p>
+            <a:r>
+              <a:rPr kumimoji="1" lang="en-US" altLang="ja-JP" sz="1400" dirty="0"/>
+              <a:t>fields:</a:t>
+            </a:r>
+          </a:p>
+          <a:p>
+            <a:r>
+              <a:rPr kumimoji="1" lang="en-US" altLang="ja-JP" sz="1400" dirty="0"/>
+              <a:t>* snippets</a:t>
+            </a:r>
+          </a:p>
+          <a:p>
+            <a:r>
+              <a:rPr kumimoji="1" lang="en-US" altLang="ja-JP" sz="800" dirty="0" err="1"/>
+              <a:t>serializers.PrimaryKeyRelatedField</a:t>
+            </a:r>
+            <a:r>
+              <a:rPr kumimoji="1" lang="en-US" altLang="ja-JP" sz="800" dirty="0"/>
+              <a:t>(many=True, </a:t>
+            </a:r>
+            <a:r>
+              <a:rPr kumimoji="1" lang="en-US" altLang="ja-JP" sz="800" dirty="0" err="1"/>
+              <a:t>queryset</a:t>
+            </a:r>
+            <a:r>
+              <a:rPr kumimoji="1" lang="en-US" altLang="ja-JP" sz="800" dirty="0"/>
+              <a:t>=</a:t>
+            </a:r>
+            <a:r>
+              <a:rPr kumimoji="1" lang="en-US" altLang="ja-JP" sz="800" dirty="0" err="1"/>
+              <a:t>Snippet.objects.all</a:t>
+            </a:r>
+            <a:r>
+              <a:rPr kumimoji="1" lang="en-US" altLang="ja-JP" sz="800" dirty="0"/>
+              <a:t>())</a:t>
+            </a:r>
+            <a:endParaRPr kumimoji="1" lang="ja-JP" altLang="en-US" sz="800" dirty="0"/>
+          </a:p>
+        </p:txBody>
+      </p:sp>
+      <p:sp>
+        <p:nvSpPr>
+          <p:cNvPr id="23" name="正方形/長方形 22">
+            <a:extLst>
+              <a:ext uri="{FF2B5EF4-FFF2-40B4-BE49-F238E27FC236}">
+                <a16:creationId xmlns:a16="http://schemas.microsoft.com/office/drawing/2014/main" id="{0ADBE8CE-3B5C-4C84-BE55-7F9E86D3E184}"/>
+              </a:ext>
+            </a:extLst>
+          </p:cNvPr>
+          <p:cNvSpPr/>
+          <p:nvPr/>
+        </p:nvSpPr>
+        <p:spPr>
+          <a:xfrm>
+            <a:off x="9504290" y="452698"/>
+            <a:ext cx="2525785" cy="562634"/>
+          </a:xfrm>
+          <a:prstGeom prst="rect">
+            <a:avLst/>
+          </a:prstGeom>
+        </p:spPr>
+        <p:style>
+          <a:lnRef idx="2">
+            <a:schemeClr val="accent1"/>
+          </a:lnRef>
+          <a:fillRef idx="1">
+            <a:schemeClr val="lt1"/>
+          </a:fillRef>
+          <a:effectRef idx="0">
+            <a:schemeClr val="accent1"/>
+          </a:effectRef>
+          <a:fontRef idx="minor">
+            <a:schemeClr val="dk1"/>
+          </a:fontRef>
+        </p:style>
+        <p:txBody>
+          <a:bodyPr rtlCol="0" anchor="ctr"/>
+          <a:lstStyle/>
+          <a:p>
+            <a:pPr algn="ctr"/>
+            <a:r>
+              <a:rPr kumimoji="1" lang="en-US" altLang="ja-JP" sz="1400" dirty="0" err="1"/>
+              <a:t>IsOwnerOrReadOnly</a:t>
+            </a:r>
+            <a:endParaRPr kumimoji="1" lang="en-US" altLang="ja-JP" sz="1400" dirty="0"/>
+          </a:p>
+          <a:p>
+            <a:pPr algn="ctr"/>
+            <a:r>
+              <a:rPr kumimoji="1" lang="en-US" altLang="ja-JP" sz="1050" dirty="0"/>
+              <a:t>(</a:t>
+            </a:r>
+            <a:r>
+              <a:rPr kumimoji="1" lang="en-US" altLang="ja-JP" sz="1050" dirty="0" err="1"/>
+              <a:t>permissions.BasePermission</a:t>
+            </a:r>
+            <a:r>
+              <a:rPr kumimoji="1" lang="en-US" altLang="ja-JP" sz="1050" dirty="0"/>
+              <a:t>)</a:t>
+            </a:r>
+            <a:endParaRPr kumimoji="1" lang="ja-JP" altLang="en-US" sz="1050" dirty="0"/>
+          </a:p>
+        </p:txBody>
+      </p:sp>
+      <p:sp>
+        <p:nvSpPr>
+          <p:cNvPr id="24" name="正方形/長方形 23">
+            <a:extLst>
+              <a:ext uri="{FF2B5EF4-FFF2-40B4-BE49-F238E27FC236}">
+                <a16:creationId xmlns:a16="http://schemas.microsoft.com/office/drawing/2014/main" id="{BF977516-81AD-476F-AE79-C4D261F3D143}"/>
+              </a:ext>
+            </a:extLst>
+          </p:cNvPr>
+          <p:cNvSpPr/>
+          <p:nvPr/>
+        </p:nvSpPr>
+        <p:spPr>
+          <a:xfrm>
+            <a:off x="9504290" y="83366"/>
+            <a:ext cx="2525785" cy="276837"/>
+          </a:xfrm>
+          <a:prstGeom prst="rect">
+            <a:avLst/>
+          </a:prstGeom>
+        </p:spPr>
+        <p:style>
+          <a:lnRef idx="2">
+            <a:schemeClr val="accent1"/>
+          </a:lnRef>
+          <a:fillRef idx="1">
+            <a:schemeClr val="lt1"/>
+          </a:fillRef>
+          <a:effectRef idx="0">
+            <a:schemeClr val="accent1"/>
+          </a:effectRef>
+          <a:fontRef idx="minor">
+            <a:schemeClr val="dk1"/>
+          </a:fontRef>
+        </p:style>
+        <p:txBody>
+          <a:bodyPr rtlCol="0" anchor="ctr"/>
+          <a:lstStyle/>
+          <a:p>
+            <a:pPr algn="ctr"/>
+            <a:r>
+              <a:rPr kumimoji="1" lang="en-US" altLang="ja-JP" sz="1400" dirty="0"/>
+              <a:t>permissions.py</a:t>
+            </a:r>
+            <a:endParaRPr kumimoji="1" lang="ja-JP" altLang="en-US" sz="1400" dirty="0"/>
+          </a:p>
+        </p:txBody>
+      </p:sp>
+      <p:sp>
+        <p:nvSpPr>
+          <p:cNvPr id="29" name="正方形/長方形 28">
+            <a:extLst>
+              <a:ext uri="{FF2B5EF4-FFF2-40B4-BE49-F238E27FC236}">
+                <a16:creationId xmlns:a16="http://schemas.microsoft.com/office/drawing/2014/main" id="{93E1CBE0-C602-437C-9E87-0980BCCE537D}"/>
+              </a:ext>
+            </a:extLst>
+          </p:cNvPr>
+          <p:cNvSpPr/>
+          <p:nvPr/>
+        </p:nvSpPr>
+        <p:spPr>
+          <a:xfrm>
+            <a:off x="3059565" y="3959340"/>
+            <a:ext cx="2525785" cy="1722156"/>
+          </a:xfrm>
+          <a:prstGeom prst="rect">
+            <a:avLst/>
+          </a:prstGeom>
+        </p:spPr>
+        <p:style>
+          <a:lnRef idx="2">
+            <a:schemeClr val="accent1"/>
+          </a:lnRef>
+          <a:fillRef idx="1">
+            <a:schemeClr val="lt1"/>
+          </a:fillRef>
+          <a:effectRef idx="0">
+            <a:schemeClr val="accent1"/>
+          </a:effectRef>
+          <a:fontRef idx="minor">
+            <a:schemeClr val="dk1"/>
+          </a:fontRef>
+        </p:style>
+        <p:txBody>
+          <a:bodyPr rtlCol="0" anchor="ctr"/>
+          <a:lstStyle/>
+          <a:p>
+            <a:r>
+              <a:rPr kumimoji="1" lang="en-US" altLang="ja-JP" sz="1400" dirty="0"/>
+              <a:t>fields:</a:t>
+            </a:r>
+          </a:p>
+          <a:p>
+            <a:r>
+              <a:rPr kumimoji="1" lang="en-US" altLang="ja-JP" sz="1400" dirty="0"/>
+              <a:t>* </a:t>
+            </a:r>
+            <a:r>
+              <a:rPr kumimoji="1" lang="en-US" altLang="ja-JP" sz="1400" dirty="0" err="1"/>
+              <a:t>queryset</a:t>
+            </a:r>
+            <a:endParaRPr kumimoji="1" lang="en-US" altLang="ja-JP" sz="1400" dirty="0"/>
+          </a:p>
+          <a:p>
+            <a:r>
+              <a:rPr kumimoji="1" lang="en-US" altLang="ja-JP" sz="800" dirty="0"/>
+              <a:t>-&gt; </a:t>
+            </a:r>
+            <a:r>
+              <a:rPr kumimoji="1" lang="en-US" altLang="ja-JP" sz="800" dirty="0" err="1"/>
+              <a:t>Snippet.objects.all</a:t>
+            </a:r>
+            <a:r>
+              <a:rPr kumimoji="1" lang="en-US" altLang="ja-JP" sz="800" dirty="0"/>
+              <a:t>()</a:t>
+            </a:r>
+          </a:p>
+          <a:p>
+            <a:r>
+              <a:rPr kumimoji="1" lang="en-US" altLang="ja-JP" sz="1400" dirty="0"/>
+              <a:t>* </a:t>
+            </a:r>
+            <a:r>
+              <a:rPr kumimoji="1" lang="en-US" altLang="ja-JP" sz="1400" dirty="0" err="1"/>
+              <a:t>serializer_class</a:t>
+            </a:r>
+            <a:endParaRPr kumimoji="1" lang="en-US" altLang="ja-JP" sz="1400" dirty="0"/>
+          </a:p>
+          <a:p>
+            <a:r>
+              <a:rPr kumimoji="1" lang="en-US" altLang="ja-JP" sz="800" dirty="0"/>
+              <a:t>-&gt; </a:t>
+            </a:r>
+            <a:r>
+              <a:rPr kumimoji="1" lang="en-US" altLang="ja-JP" sz="800" dirty="0" err="1"/>
+              <a:t>SnippetSerializer</a:t>
+            </a:r>
+            <a:endParaRPr kumimoji="1" lang="en-US" altLang="ja-JP" sz="800" dirty="0"/>
+          </a:p>
+          <a:p>
+            <a:r>
+              <a:rPr kumimoji="1" lang="en-US" altLang="ja-JP" sz="1400" dirty="0"/>
+              <a:t>* </a:t>
+            </a:r>
+            <a:r>
+              <a:rPr kumimoji="1" lang="en-US" altLang="ja-JP" sz="1400" dirty="0" err="1"/>
+              <a:t>permission_classes</a:t>
+            </a:r>
+            <a:endParaRPr kumimoji="1" lang="en-US" altLang="ja-JP" sz="1400" dirty="0"/>
+          </a:p>
+          <a:p>
+            <a:r>
+              <a:rPr kumimoji="1" lang="en-US" altLang="ja-JP" sz="800" dirty="0"/>
+              <a:t>-&gt; </a:t>
+            </a:r>
+            <a:r>
+              <a:rPr kumimoji="1" lang="en-US" altLang="ja-JP" sz="800" dirty="0" err="1"/>
+              <a:t>permission_classes</a:t>
+            </a:r>
+            <a:r>
+              <a:rPr kumimoji="1" lang="en-US" altLang="ja-JP" sz="800" dirty="0"/>
+              <a:t> = [</a:t>
+            </a:r>
+            <a:r>
+              <a:rPr kumimoji="1" lang="en-US" altLang="ja-JP" sz="800" dirty="0" err="1"/>
+              <a:t>permissions.IsAuthenticatedOrReadOnly</a:t>
+            </a:r>
+            <a:r>
+              <a:rPr kumimoji="1" lang="en-US" altLang="ja-JP" sz="800" dirty="0"/>
+              <a:t>, </a:t>
+            </a:r>
+            <a:r>
+              <a:rPr kumimoji="1" lang="en-US" altLang="ja-JP" sz="800" dirty="0" err="1"/>
+              <a:t>IsOwnerOrReadOnly</a:t>
+            </a:r>
+            <a:r>
+              <a:rPr kumimoji="1" lang="en-US" altLang="ja-JP" sz="800" dirty="0"/>
+              <a:t>]</a:t>
+            </a:r>
+          </a:p>
+          <a:p>
+            <a:endParaRPr kumimoji="1" lang="en-US" altLang="ja-JP" sz="1400" dirty="0"/>
+          </a:p>
+        </p:txBody>
+      </p:sp>
+      <p:sp>
+        <p:nvSpPr>
+          <p:cNvPr id="31" name="正方形/長方形 30">
+            <a:extLst>
+              <a:ext uri="{FF2B5EF4-FFF2-40B4-BE49-F238E27FC236}">
+                <a16:creationId xmlns:a16="http://schemas.microsoft.com/office/drawing/2014/main" id="{08EFCFF8-D6DC-4C5C-B887-EC91C97DE44F}"/>
+              </a:ext>
+            </a:extLst>
+          </p:cNvPr>
+          <p:cNvSpPr/>
+          <p:nvPr/>
+        </p:nvSpPr>
+        <p:spPr>
+          <a:xfrm>
+            <a:off x="5755140" y="3957756"/>
+            <a:ext cx="2695719" cy="1722156"/>
+          </a:xfrm>
+          <a:prstGeom prst="rect">
+            <a:avLst/>
+          </a:prstGeom>
+        </p:spPr>
+        <p:style>
+          <a:lnRef idx="2">
+            <a:schemeClr val="accent1"/>
+          </a:lnRef>
+          <a:fillRef idx="1">
+            <a:schemeClr val="lt1"/>
+          </a:fillRef>
+          <a:effectRef idx="0">
+            <a:schemeClr val="accent1"/>
+          </a:effectRef>
+          <a:fontRef idx="minor">
+            <a:schemeClr val="dk1"/>
+          </a:fontRef>
+        </p:style>
+        <p:txBody>
+          <a:bodyPr rtlCol="0" anchor="ctr"/>
+          <a:lstStyle/>
+          <a:p>
+            <a:r>
+              <a:rPr kumimoji="1" lang="en-US" altLang="ja-JP" sz="1400" dirty="0"/>
+              <a:t>fields:</a:t>
+            </a:r>
+          </a:p>
+          <a:p>
+            <a:r>
+              <a:rPr kumimoji="1" lang="en-US" altLang="ja-JP" sz="1400" dirty="0"/>
+              <a:t>* </a:t>
+            </a:r>
+            <a:r>
+              <a:rPr kumimoji="1" lang="en-US" altLang="ja-JP" sz="1400" dirty="0" err="1"/>
+              <a:t>queryset</a:t>
+            </a:r>
+            <a:endParaRPr kumimoji="1" lang="en-US" altLang="ja-JP" sz="1400" dirty="0"/>
+          </a:p>
+          <a:p>
+            <a:r>
+              <a:rPr kumimoji="1" lang="en-US" altLang="ja-JP" sz="800" dirty="0"/>
+              <a:t>-&gt; </a:t>
+            </a:r>
+            <a:r>
+              <a:rPr kumimoji="1" lang="en-US" altLang="ja-JP" sz="800" dirty="0" err="1"/>
+              <a:t>Snippet.objects.all</a:t>
+            </a:r>
+            <a:r>
+              <a:rPr kumimoji="1" lang="en-US" altLang="ja-JP" sz="800" dirty="0"/>
+              <a:t>()</a:t>
+            </a:r>
+          </a:p>
+          <a:p>
+            <a:r>
+              <a:rPr kumimoji="1" lang="en-US" altLang="ja-JP" sz="1400" dirty="0"/>
+              <a:t>* </a:t>
+            </a:r>
+            <a:r>
+              <a:rPr kumimoji="1" lang="en-US" altLang="ja-JP" sz="1400" dirty="0" err="1"/>
+              <a:t>serializer_class</a:t>
+            </a:r>
+            <a:endParaRPr kumimoji="1" lang="en-US" altLang="ja-JP" sz="1400" dirty="0"/>
+          </a:p>
+          <a:p>
+            <a:r>
+              <a:rPr kumimoji="1" lang="en-US" altLang="ja-JP" sz="800" dirty="0"/>
+              <a:t>-&gt; </a:t>
+            </a:r>
+            <a:r>
+              <a:rPr kumimoji="1" lang="en-US" altLang="ja-JP" sz="800" dirty="0" err="1"/>
+              <a:t>SnippetSerializer</a:t>
+            </a:r>
+            <a:endParaRPr kumimoji="1" lang="en-US" altLang="ja-JP" sz="800" dirty="0"/>
+          </a:p>
+          <a:p>
+            <a:r>
+              <a:rPr kumimoji="1" lang="en-US" altLang="ja-JP" sz="1400" dirty="0"/>
+              <a:t>* </a:t>
+            </a:r>
+            <a:r>
+              <a:rPr kumimoji="1" lang="en-US" altLang="ja-JP" sz="1400" dirty="0" err="1"/>
+              <a:t>permission_classes</a:t>
+            </a:r>
+            <a:endParaRPr kumimoji="1" lang="en-US" altLang="ja-JP" sz="1400" dirty="0"/>
+          </a:p>
+          <a:p>
+            <a:r>
+              <a:rPr kumimoji="1" lang="en-US" altLang="ja-JP" sz="800" dirty="0"/>
+              <a:t>-&gt; </a:t>
+            </a:r>
+            <a:r>
+              <a:rPr kumimoji="1" lang="en-US" altLang="ja-JP" sz="800" dirty="0" err="1"/>
+              <a:t>permission_classes</a:t>
+            </a:r>
+            <a:r>
+              <a:rPr kumimoji="1" lang="en-US" altLang="ja-JP" sz="800" dirty="0"/>
+              <a:t> = [</a:t>
+            </a:r>
+            <a:r>
+              <a:rPr kumimoji="1" lang="en-US" altLang="ja-JP" sz="800" dirty="0" err="1"/>
+              <a:t>permissions.IsAuthenticatedOrReadOnly</a:t>
+            </a:r>
+            <a:r>
+              <a:rPr kumimoji="1" lang="en-US" altLang="ja-JP" sz="800" dirty="0"/>
+              <a:t>, </a:t>
+            </a:r>
+            <a:r>
+              <a:rPr kumimoji="1" lang="en-US" altLang="ja-JP" sz="800" dirty="0" err="1"/>
+              <a:t>IsOwnerOrReadOnly</a:t>
+            </a:r>
+            <a:r>
+              <a:rPr kumimoji="1" lang="en-US" altLang="ja-JP" sz="800" dirty="0"/>
+              <a:t>]</a:t>
+            </a:r>
+          </a:p>
+          <a:p>
+            <a:endParaRPr kumimoji="1" lang="en-US" altLang="ja-JP" sz="1400" dirty="0"/>
+          </a:p>
+        </p:txBody>
+      </p:sp>
+      <p:sp>
+        <p:nvSpPr>
+          <p:cNvPr id="32" name="正方形/長方形 31">
+            <a:extLst>
+              <a:ext uri="{FF2B5EF4-FFF2-40B4-BE49-F238E27FC236}">
+                <a16:creationId xmlns:a16="http://schemas.microsoft.com/office/drawing/2014/main" id="{95ED2ADA-2440-4058-B06E-C8355BA726A8}"/>
+              </a:ext>
+            </a:extLst>
+          </p:cNvPr>
+          <p:cNvSpPr/>
+          <p:nvPr/>
+        </p:nvSpPr>
+        <p:spPr>
+          <a:xfrm>
+            <a:off x="3059565" y="5767346"/>
+            <a:ext cx="2525785" cy="1007288"/>
+          </a:xfrm>
+          <a:prstGeom prst="rect">
+            <a:avLst/>
+          </a:prstGeom>
+        </p:spPr>
+        <p:style>
+          <a:lnRef idx="2">
+            <a:schemeClr val="accent1"/>
+          </a:lnRef>
+          <a:fillRef idx="1">
+            <a:schemeClr val="lt1"/>
+          </a:fillRef>
+          <a:effectRef idx="0">
+            <a:schemeClr val="accent1"/>
+          </a:effectRef>
+          <a:fontRef idx="minor">
+            <a:schemeClr val="dk1"/>
+          </a:fontRef>
+        </p:style>
+        <p:txBody>
+          <a:bodyPr rtlCol="0" anchor="ctr"/>
+          <a:lstStyle/>
+          <a:p>
+            <a:r>
+              <a:rPr kumimoji="1" lang="en-US" altLang="ja-JP" sz="1400" dirty="0"/>
+              <a:t>methods:</a:t>
+            </a:r>
+          </a:p>
+          <a:p>
+            <a:r>
+              <a:rPr kumimoji="1" lang="en-US" altLang="ja-JP" sz="1400" dirty="0"/>
+              <a:t>* </a:t>
+            </a:r>
+            <a:r>
+              <a:rPr kumimoji="1" lang="en-US" altLang="ja-JP" sz="1400" dirty="0" err="1"/>
+              <a:t>perform_create</a:t>
+            </a:r>
+            <a:r>
+              <a:rPr kumimoji="1" lang="en-US" altLang="ja-JP" sz="1400" dirty="0"/>
+              <a:t>(self, serializer)</a:t>
+            </a:r>
+          </a:p>
+          <a:p>
+            <a:r>
+              <a:rPr kumimoji="1" lang="en-US" altLang="ja-JP" sz="800" dirty="0"/>
+              <a:t>-&gt; </a:t>
+            </a:r>
+            <a:r>
+              <a:rPr kumimoji="1" lang="ja-JP" altLang="en-US" sz="800" dirty="0"/>
+              <a:t>ユーザとスニペットを紐付け</a:t>
+            </a:r>
+            <a:endParaRPr kumimoji="1" lang="en-US" altLang="ja-JP" sz="800" dirty="0"/>
+          </a:p>
+          <a:p>
+            <a:r>
+              <a:rPr kumimoji="1" lang="en-US" altLang="ja-JP" sz="800" dirty="0"/>
+              <a:t>-&gt; </a:t>
+            </a:r>
+            <a:r>
+              <a:rPr kumimoji="1" lang="en-US" altLang="ja-JP" sz="800" dirty="0" err="1"/>
+              <a:t>serializer.save</a:t>
+            </a:r>
+            <a:r>
+              <a:rPr kumimoji="1" lang="en-US" altLang="ja-JP" sz="800" dirty="0"/>
+              <a:t>(owner=</a:t>
+            </a:r>
+            <a:r>
+              <a:rPr kumimoji="1" lang="en-US" altLang="ja-JP" sz="800" dirty="0" err="1"/>
+              <a:t>request.user</a:t>
+            </a:r>
+            <a:r>
+              <a:rPr kumimoji="1" lang="en-US" altLang="ja-JP" sz="800" dirty="0"/>
+              <a:t>)</a:t>
+            </a:r>
+          </a:p>
+          <a:p>
+            <a:endParaRPr kumimoji="1" lang="en-US" altLang="ja-JP" sz="1400" dirty="0"/>
+          </a:p>
+        </p:txBody>
+      </p:sp>
+      <p:sp>
+        <p:nvSpPr>
+          <p:cNvPr id="33" name="正方形/長方形 32">
+            <a:extLst>
+              <a:ext uri="{FF2B5EF4-FFF2-40B4-BE49-F238E27FC236}">
+                <a16:creationId xmlns:a16="http://schemas.microsoft.com/office/drawing/2014/main" id="{393579EE-6F21-4679-8ED2-C65FF7155D3E}"/>
+              </a:ext>
+            </a:extLst>
+          </p:cNvPr>
+          <p:cNvSpPr/>
+          <p:nvPr/>
+        </p:nvSpPr>
+        <p:spPr>
+          <a:xfrm>
+            <a:off x="8518440" y="3312254"/>
+            <a:ext cx="1658208" cy="507316"/>
+          </a:xfrm>
+          <a:prstGeom prst="rect">
+            <a:avLst/>
+          </a:prstGeom>
+        </p:spPr>
+        <p:style>
+          <a:lnRef idx="2">
+            <a:schemeClr val="accent1"/>
+          </a:lnRef>
+          <a:fillRef idx="1">
+            <a:schemeClr val="lt1"/>
+          </a:fillRef>
+          <a:effectRef idx="0">
+            <a:schemeClr val="accent1"/>
+          </a:effectRef>
+          <a:fontRef idx="minor">
+            <a:schemeClr val="dk1"/>
+          </a:fontRef>
+        </p:style>
+        <p:txBody>
+          <a:bodyPr rtlCol="0" anchor="ctr"/>
+          <a:lstStyle/>
+          <a:p>
+            <a:pPr algn="ctr"/>
+            <a:r>
+              <a:rPr kumimoji="1" lang="en-US" altLang="ja-JP" sz="1400" dirty="0" err="1"/>
+              <a:t>UserList</a:t>
+            </a:r>
+            <a:endParaRPr kumimoji="1" lang="en-US" altLang="ja-JP" sz="1400" dirty="0"/>
+          </a:p>
+          <a:p>
+            <a:pPr algn="ctr"/>
+            <a:r>
+              <a:rPr kumimoji="1" lang="en-US" altLang="ja-JP" sz="1050" dirty="0"/>
+              <a:t>(</a:t>
+            </a:r>
+            <a:r>
+              <a:rPr kumimoji="1" lang="en-US" altLang="ja-JP" sz="1050" dirty="0" err="1"/>
+              <a:t>generics.ListAPIView</a:t>
+            </a:r>
+            <a:r>
+              <a:rPr kumimoji="1" lang="en-US" altLang="ja-JP" sz="1050" dirty="0"/>
+              <a:t>)</a:t>
+            </a:r>
+            <a:endParaRPr kumimoji="1" lang="ja-JP" altLang="en-US" sz="1050" dirty="0"/>
+          </a:p>
+        </p:txBody>
+      </p:sp>
+      <p:sp>
+        <p:nvSpPr>
+          <p:cNvPr id="34" name="正方形/長方形 33">
+            <a:extLst>
+              <a:ext uri="{FF2B5EF4-FFF2-40B4-BE49-F238E27FC236}">
+                <a16:creationId xmlns:a16="http://schemas.microsoft.com/office/drawing/2014/main" id="{8773EEC9-BF3D-4184-993A-B728BA4221FF}"/>
+              </a:ext>
+            </a:extLst>
+          </p:cNvPr>
+          <p:cNvSpPr/>
+          <p:nvPr/>
+        </p:nvSpPr>
+        <p:spPr>
+          <a:xfrm>
+            <a:off x="10244229" y="3312254"/>
+            <a:ext cx="1785846" cy="507316"/>
+          </a:xfrm>
+          <a:prstGeom prst="rect">
+            <a:avLst/>
+          </a:prstGeom>
+        </p:spPr>
+        <p:style>
+          <a:lnRef idx="2">
+            <a:schemeClr val="accent1"/>
+          </a:lnRef>
+          <a:fillRef idx="1">
+            <a:schemeClr val="lt1"/>
+          </a:fillRef>
+          <a:effectRef idx="0">
+            <a:schemeClr val="accent1"/>
+          </a:effectRef>
+          <a:fontRef idx="minor">
+            <a:schemeClr val="dk1"/>
+          </a:fontRef>
+        </p:style>
+        <p:txBody>
+          <a:bodyPr rtlCol="0" anchor="ctr"/>
+          <a:lstStyle/>
+          <a:p>
+            <a:pPr algn="ctr"/>
+            <a:r>
+              <a:rPr kumimoji="1" lang="en-US" altLang="ja-JP" sz="1400" dirty="0" err="1"/>
+              <a:t>UserDetail</a:t>
+            </a:r>
+            <a:endParaRPr kumimoji="1" lang="en-US" altLang="ja-JP" sz="1400" dirty="0"/>
+          </a:p>
+          <a:p>
+            <a:pPr algn="ctr"/>
+            <a:r>
+              <a:rPr kumimoji="1" lang="en-US" altLang="ja-JP" sz="1050" dirty="0"/>
+              <a:t>(</a:t>
+            </a:r>
+            <a:r>
+              <a:rPr kumimoji="1" lang="en-US" altLang="ja-JP" sz="1050" dirty="0" err="1"/>
+              <a:t>generics.RetriveAPIView</a:t>
+            </a:r>
+            <a:r>
+              <a:rPr kumimoji="1" lang="en-US" altLang="ja-JP" sz="1050" dirty="0"/>
+              <a:t>)</a:t>
+            </a:r>
+            <a:endParaRPr kumimoji="1" lang="ja-JP" altLang="en-US" sz="1050" dirty="0"/>
+          </a:p>
+        </p:txBody>
+      </p:sp>
+      <p:sp>
+        <p:nvSpPr>
+          <p:cNvPr id="35" name="正方形/長方形 34">
+            <a:extLst>
+              <a:ext uri="{FF2B5EF4-FFF2-40B4-BE49-F238E27FC236}">
+                <a16:creationId xmlns:a16="http://schemas.microsoft.com/office/drawing/2014/main" id="{DF5A48EE-193E-4415-87FA-7CA4CA6CC04E}"/>
+              </a:ext>
+            </a:extLst>
+          </p:cNvPr>
+          <p:cNvSpPr/>
+          <p:nvPr/>
+        </p:nvSpPr>
+        <p:spPr>
+          <a:xfrm>
+            <a:off x="8518441" y="3957756"/>
+            <a:ext cx="1658208" cy="1722155"/>
+          </a:xfrm>
+          <a:prstGeom prst="rect">
+            <a:avLst/>
+          </a:prstGeom>
+        </p:spPr>
+        <p:style>
+          <a:lnRef idx="2">
+            <a:schemeClr val="accent1"/>
+          </a:lnRef>
+          <a:fillRef idx="1">
+            <a:schemeClr val="lt1"/>
+          </a:fillRef>
+          <a:effectRef idx="0">
+            <a:schemeClr val="accent1"/>
+          </a:effectRef>
+          <a:fontRef idx="minor">
+            <a:schemeClr val="dk1"/>
+          </a:fontRef>
+        </p:style>
+        <p:txBody>
+          <a:bodyPr rtlCol="0" anchor="t"/>
+          <a:lstStyle/>
+          <a:p>
+            <a:r>
+              <a:rPr kumimoji="1" lang="en-US" altLang="ja-JP" sz="1400" dirty="0"/>
+              <a:t>fields:</a:t>
+            </a:r>
+          </a:p>
+          <a:p>
+            <a:r>
+              <a:rPr kumimoji="1" lang="en-US" altLang="ja-JP" sz="1400" dirty="0"/>
+              <a:t>* </a:t>
+            </a:r>
+            <a:r>
+              <a:rPr kumimoji="1" lang="en-US" altLang="ja-JP" sz="1400" dirty="0" err="1"/>
+              <a:t>queryset</a:t>
+            </a:r>
+            <a:endParaRPr kumimoji="1" lang="en-US" altLang="ja-JP" sz="1400" dirty="0"/>
+          </a:p>
+          <a:p>
+            <a:r>
+              <a:rPr kumimoji="1" lang="en-US" altLang="ja-JP" sz="800" dirty="0"/>
+              <a:t>-&gt; </a:t>
+            </a:r>
+            <a:r>
+              <a:rPr kumimoji="1" lang="en-US" altLang="ja-JP" sz="800" dirty="0" err="1"/>
+              <a:t>User.objects.all</a:t>
+            </a:r>
+            <a:r>
+              <a:rPr kumimoji="1" lang="en-US" altLang="ja-JP" sz="800" dirty="0"/>
+              <a:t>()</a:t>
+            </a:r>
+          </a:p>
+          <a:p>
+            <a:r>
+              <a:rPr kumimoji="1" lang="en-US" altLang="ja-JP" sz="1400" dirty="0"/>
+              <a:t>* </a:t>
+            </a:r>
+            <a:r>
+              <a:rPr kumimoji="1" lang="en-US" altLang="ja-JP" sz="1400" dirty="0" err="1"/>
+              <a:t>serializer_class</a:t>
+            </a:r>
+            <a:endParaRPr kumimoji="1" lang="en-US" altLang="ja-JP" sz="1400" dirty="0"/>
+          </a:p>
+          <a:p>
+            <a:r>
+              <a:rPr kumimoji="1" lang="en-US" altLang="ja-JP" sz="800" dirty="0"/>
+              <a:t>-&gt; </a:t>
+            </a:r>
+            <a:r>
+              <a:rPr kumimoji="1" lang="en-US" altLang="ja-JP" sz="800" dirty="0" err="1"/>
+              <a:t>UserSerializer</a:t>
+            </a:r>
+            <a:endParaRPr kumimoji="1" lang="en-US" altLang="ja-JP" sz="800" dirty="0"/>
+          </a:p>
+          <a:p>
+            <a:endParaRPr kumimoji="1" lang="en-US" altLang="ja-JP" sz="1400" dirty="0"/>
+          </a:p>
+        </p:txBody>
+      </p:sp>
+      <p:sp>
+        <p:nvSpPr>
+          <p:cNvPr id="36" name="正方形/長方形 35">
+            <a:extLst>
+              <a:ext uri="{FF2B5EF4-FFF2-40B4-BE49-F238E27FC236}">
+                <a16:creationId xmlns:a16="http://schemas.microsoft.com/office/drawing/2014/main" id="{2E526A88-A1CD-438E-8472-67184CE1D902}"/>
+              </a:ext>
+            </a:extLst>
+          </p:cNvPr>
+          <p:cNvSpPr/>
+          <p:nvPr/>
+        </p:nvSpPr>
+        <p:spPr>
+          <a:xfrm>
+            <a:off x="10244229" y="3957756"/>
+            <a:ext cx="1785846" cy="1722155"/>
+          </a:xfrm>
+          <a:prstGeom prst="rect">
+            <a:avLst/>
+          </a:prstGeom>
+        </p:spPr>
+        <p:style>
+          <a:lnRef idx="2">
+            <a:schemeClr val="accent1"/>
+          </a:lnRef>
+          <a:fillRef idx="1">
+            <a:schemeClr val="lt1"/>
+          </a:fillRef>
+          <a:effectRef idx="0">
+            <a:schemeClr val="accent1"/>
+          </a:effectRef>
+          <a:fontRef idx="minor">
+            <a:schemeClr val="dk1"/>
+          </a:fontRef>
+        </p:style>
+        <p:txBody>
+          <a:bodyPr rtlCol="0" anchor="t"/>
+          <a:lstStyle/>
+          <a:p>
+            <a:r>
+              <a:rPr kumimoji="1" lang="en-US" altLang="ja-JP" sz="1400" dirty="0"/>
+              <a:t>fields:</a:t>
+            </a:r>
+          </a:p>
+          <a:p>
+            <a:r>
+              <a:rPr kumimoji="1" lang="en-US" altLang="ja-JP" sz="1400" dirty="0"/>
+              <a:t>* </a:t>
+            </a:r>
+            <a:r>
+              <a:rPr kumimoji="1" lang="en-US" altLang="ja-JP" sz="1400" dirty="0" err="1"/>
+              <a:t>queryset</a:t>
+            </a:r>
+            <a:endParaRPr kumimoji="1" lang="en-US" altLang="ja-JP" sz="1400" dirty="0"/>
+          </a:p>
+          <a:p>
+            <a:r>
+              <a:rPr kumimoji="1" lang="en-US" altLang="ja-JP" sz="800" dirty="0"/>
+              <a:t>-&gt; </a:t>
+            </a:r>
+            <a:r>
+              <a:rPr kumimoji="1" lang="en-US" altLang="ja-JP" sz="800" dirty="0" err="1"/>
+              <a:t>User.objects.all</a:t>
+            </a:r>
+            <a:r>
+              <a:rPr kumimoji="1" lang="en-US" altLang="ja-JP" sz="800" dirty="0"/>
+              <a:t>()</a:t>
+            </a:r>
+          </a:p>
+          <a:p>
+            <a:r>
+              <a:rPr kumimoji="1" lang="en-US" altLang="ja-JP" sz="1400" dirty="0"/>
+              <a:t>* </a:t>
+            </a:r>
+            <a:r>
+              <a:rPr kumimoji="1" lang="en-US" altLang="ja-JP" sz="1400" dirty="0" err="1"/>
+              <a:t>serializer_class</a:t>
+            </a:r>
+            <a:endParaRPr kumimoji="1" lang="en-US" altLang="ja-JP" sz="1400" dirty="0"/>
+          </a:p>
+          <a:p>
+            <a:r>
+              <a:rPr kumimoji="1" lang="en-US" altLang="ja-JP" sz="800" dirty="0"/>
+              <a:t>-&gt; </a:t>
+            </a:r>
+            <a:r>
+              <a:rPr kumimoji="1" lang="en-US" altLang="ja-JP" sz="800" dirty="0" err="1"/>
+              <a:t>UserSerializer</a:t>
+            </a:r>
+            <a:endParaRPr kumimoji="1" lang="en-US" altLang="ja-JP" sz="800" dirty="0"/>
+          </a:p>
+          <a:p>
+            <a:endParaRPr kumimoji="1" lang="en-US" altLang="ja-JP" sz="1400" dirty="0"/>
+          </a:p>
+        </p:txBody>
+      </p:sp>
+      <p:cxnSp>
+        <p:nvCxnSpPr>
+          <p:cNvPr id="51" name="コネクタ: カギ線 50">
+            <a:extLst>
+              <a:ext uri="{FF2B5EF4-FFF2-40B4-BE49-F238E27FC236}">
+                <a16:creationId xmlns:a16="http://schemas.microsoft.com/office/drawing/2014/main" id="{1695D5D4-9756-4C8F-9251-06EDFE518C56}"/>
+              </a:ext>
+            </a:extLst>
+          </p:cNvPr>
+          <p:cNvCxnSpPr>
+            <a:cxnSpLocks/>
+            <a:stCxn id="23" idx="2"/>
+            <a:endCxn id="31" idx="0"/>
+          </p:cNvCxnSpPr>
+          <p:nvPr/>
+        </p:nvCxnSpPr>
+        <p:spPr>
+          <a:xfrm rot="5400000">
+            <a:off x="7463880" y="654453"/>
+            <a:ext cx="2942424" cy="3664183"/>
+          </a:xfrm>
+          <a:prstGeom prst="bentConnector3">
+            <a:avLst>
+              <a:gd name="adj1" fmla="val 57122"/>
+            </a:avLst>
+          </a:prstGeom>
+          <a:ln w="19050">
+            <a:prstDash val="dash"/>
+            <a:tailEnd type="triangle"/>
+          </a:ln>
+        </p:spPr>
+        <p:style>
+          <a:lnRef idx="3">
+            <a:schemeClr val="accent2"/>
+          </a:lnRef>
+          <a:fillRef idx="0">
+            <a:schemeClr val="accent2"/>
+          </a:fillRef>
+          <a:effectRef idx="2">
+            <a:schemeClr val="accent2"/>
+          </a:effectRef>
+          <a:fontRef idx="minor">
+            <a:schemeClr val="tx1"/>
+          </a:fontRef>
+        </p:style>
+      </p:cxnSp>
+      <p:sp>
+        <p:nvSpPr>
+          <p:cNvPr id="25" name="正方形/長方形 24">
+            <a:extLst>
+              <a:ext uri="{FF2B5EF4-FFF2-40B4-BE49-F238E27FC236}">
+                <a16:creationId xmlns:a16="http://schemas.microsoft.com/office/drawing/2014/main" id="{4AC96355-D2FE-418B-A865-54720E2E12C3}"/>
+              </a:ext>
+            </a:extLst>
+          </p:cNvPr>
+          <p:cNvSpPr/>
+          <p:nvPr/>
+        </p:nvSpPr>
+        <p:spPr>
+          <a:xfrm>
+            <a:off x="9504289" y="1155102"/>
+            <a:ext cx="2525785" cy="1327214"/>
+          </a:xfrm>
+          <a:prstGeom prst="rect">
+            <a:avLst/>
+          </a:prstGeom>
+        </p:spPr>
+        <p:style>
+          <a:lnRef idx="2">
+            <a:schemeClr val="accent1"/>
+          </a:lnRef>
+          <a:fillRef idx="1">
+            <a:schemeClr val="lt1"/>
+          </a:fillRef>
+          <a:effectRef idx="0">
+            <a:schemeClr val="accent1"/>
+          </a:effectRef>
+          <a:fontRef idx="minor">
+            <a:schemeClr val="dk1"/>
+          </a:fontRef>
+        </p:style>
+        <p:txBody>
+          <a:bodyPr rtlCol="0" anchor="ctr"/>
+          <a:lstStyle/>
+          <a:p>
+            <a:r>
+              <a:rPr kumimoji="1" lang="en-US" altLang="ja-JP" sz="1400" dirty="0"/>
+              <a:t>methods:</a:t>
+            </a:r>
+          </a:p>
+          <a:p>
+            <a:r>
+              <a:rPr kumimoji="1" lang="en-US" altLang="ja-JP" sz="1400" dirty="0"/>
+              <a:t>* </a:t>
+            </a:r>
+            <a:r>
+              <a:rPr kumimoji="1" lang="en-US" altLang="ja-JP" sz="1400" dirty="0" err="1"/>
+              <a:t>has_object_permission</a:t>
+            </a:r>
+            <a:r>
+              <a:rPr kumimoji="1" lang="en-US" altLang="ja-JP" sz="1400" dirty="0"/>
+              <a:t>(self, request, view, obj)</a:t>
+            </a:r>
+          </a:p>
+          <a:p>
+            <a:endParaRPr kumimoji="1" lang="en-US" altLang="ja-JP" sz="800" dirty="0"/>
+          </a:p>
+          <a:p>
+            <a:r>
+              <a:rPr kumimoji="1" lang="en-US" altLang="ja-JP" sz="800" dirty="0" err="1"/>
+              <a:t>request.method</a:t>
+            </a:r>
+            <a:r>
+              <a:rPr kumimoji="1" lang="en-US" altLang="ja-JP" sz="800" dirty="0"/>
+              <a:t> in </a:t>
+            </a:r>
+            <a:r>
+              <a:rPr kumimoji="1" lang="en-US" altLang="ja-JP" sz="800" dirty="0" err="1"/>
+              <a:t>permissions.SAFE_METHODS</a:t>
+            </a:r>
+            <a:endParaRPr kumimoji="1" lang="en-US" altLang="ja-JP" sz="800" dirty="0"/>
+          </a:p>
+          <a:p>
+            <a:r>
+              <a:rPr kumimoji="1" lang="en-US" altLang="ja-JP" sz="800" dirty="0"/>
+              <a:t>-&gt; True</a:t>
+            </a:r>
+          </a:p>
+          <a:p>
+            <a:r>
+              <a:rPr kumimoji="1" lang="en-US" altLang="ja-JP" sz="800" dirty="0" err="1"/>
+              <a:t>obj.owner</a:t>
+            </a:r>
+            <a:r>
+              <a:rPr kumimoji="1" lang="en-US" altLang="ja-JP" sz="800" dirty="0"/>
+              <a:t> == </a:t>
+            </a:r>
+            <a:r>
+              <a:rPr kumimoji="1" lang="en-US" altLang="ja-JP" sz="800" dirty="0" err="1"/>
+              <a:t>request.user</a:t>
+            </a:r>
+            <a:r>
+              <a:rPr kumimoji="1" lang="en-US" altLang="ja-JP" sz="800" dirty="0"/>
+              <a:t> -&gt; True or False</a:t>
+            </a:r>
+          </a:p>
+        </p:txBody>
+      </p:sp>
+      <p:sp>
+        <p:nvSpPr>
+          <p:cNvPr id="26" name="正方形/長方形 25">
+            <a:extLst>
+              <a:ext uri="{FF2B5EF4-FFF2-40B4-BE49-F238E27FC236}">
+                <a16:creationId xmlns:a16="http://schemas.microsoft.com/office/drawing/2014/main" id="{AF6D8695-5929-4164-98C7-564D4BFC017B}"/>
+              </a:ext>
+            </a:extLst>
+          </p:cNvPr>
+          <p:cNvSpPr/>
+          <p:nvPr/>
+        </p:nvSpPr>
+        <p:spPr>
+          <a:xfrm>
+            <a:off x="3059565" y="2895647"/>
+            <a:ext cx="8970510" cy="276837"/>
+          </a:xfrm>
+          <a:prstGeom prst="rect">
+            <a:avLst/>
+          </a:prstGeom>
+        </p:spPr>
+        <p:style>
+          <a:lnRef idx="2">
+            <a:schemeClr val="accent1"/>
+          </a:lnRef>
+          <a:fillRef idx="1">
+            <a:schemeClr val="lt1"/>
+          </a:fillRef>
+          <a:effectRef idx="0">
+            <a:schemeClr val="accent1"/>
+          </a:effectRef>
+          <a:fontRef idx="minor">
+            <a:schemeClr val="dk1"/>
+          </a:fontRef>
+        </p:style>
+        <p:txBody>
+          <a:bodyPr rtlCol="0" anchor="ctr"/>
+          <a:lstStyle/>
+          <a:p>
+            <a:pPr algn="ctr"/>
+            <a:r>
+              <a:rPr kumimoji="1" lang="en-US" altLang="ja-JP" sz="1400" dirty="0"/>
+              <a:t>views.py</a:t>
+            </a:r>
+            <a:endParaRPr kumimoji="1" lang="ja-JP" altLang="en-US" sz="1400" dirty="0"/>
+          </a:p>
+        </p:txBody>
+      </p:sp>
+      <p:sp>
+        <p:nvSpPr>
+          <p:cNvPr id="27" name="正方形/長方形 26">
+            <a:extLst>
+              <a:ext uri="{FF2B5EF4-FFF2-40B4-BE49-F238E27FC236}">
+                <a16:creationId xmlns:a16="http://schemas.microsoft.com/office/drawing/2014/main" id="{89BEC0B2-E346-4EF2-B19D-7E150DC98AB5}"/>
+              </a:ext>
+            </a:extLst>
+          </p:cNvPr>
+          <p:cNvSpPr/>
+          <p:nvPr/>
+        </p:nvSpPr>
+        <p:spPr>
+          <a:xfrm>
+            <a:off x="3059565" y="3312254"/>
+            <a:ext cx="2525785" cy="507316"/>
+          </a:xfrm>
+          <a:prstGeom prst="rect">
+            <a:avLst/>
+          </a:prstGeom>
+        </p:spPr>
+        <p:style>
+          <a:lnRef idx="2">
+            <a:schemeClr val="accent1"/>
+          </a:lnRef>
+          <a:fillRef idx="1">
+            <a:schemeClr val="lt1"/>
+          </a:fillRef>
+          <a:effectRef idx="0">
+            <a:schemeClr val="accent1"/>
+          </a:effectRef>
+          <a:fontRef idx="minor">
+            <a:schemeClr val="dk1"/>
+          </a:fontRef>
+        </p:style>
+        <p:txBody>
+          <a:bodyPr rtlCol="0" anchor="ctr"/>
+          <a:lstStyle/>
+          <a:p>
+            <a:pPr algn="ctr"/>
+            <a:r>
+              <a:rPr kumimoji="1" lang="en-US" altLang="ja-JP" sz="1400" dirty="0" err="1"/>
+              <a:t>SnippetList</a:t>
+            </a:r>
+            <a:endParaRPr kumimoji="1" lang="en-US" altLang="ja-JP" sz="1400" dirty="0"/>
+          </a:p>
+          <a:p>
+            <a:pPr algn="ctr"/>
+            <a:r>
+              <a:rPr kumimoji="1" lang="en-US" altLang="ja-JP" sz="1050" dirty="0"/>
+              <a:t>(</a:t>
+            </a:r>
+            <a:r>
+              <a:rPr kumimoji="1" lang="en-US" altLang="ja-JP" sz="1050" dirty="0" err="1"/>
+              <a:t>generics.ListCreateAPIView</a:t>
+            </a:r>
+            <a:r>
+              <a:rPr kumimoji="1" lang="en-US" altLang="ja-JP" sz="1050" dirty="0"/>
+              <a:t>)</a:t>
+            </a:r>
+            <a:endParaRPr kumimoji="1" lang="ja-JP" altLang="en-US" sz="1050" dirty="0"/>
+          </a:p>
+        </p:txBody>
+      </p:sp>
+      <p:sp>
+        <p:nvSpPr>
+          <p:cNvPr id="30" name="正方形/長方形 29">
+            <a:extLst>
+              <a:ext uri="{FF2B5EF4-FFF2-40B4-BE49-F238E27FC236}">
+                <a16:creationId xmlns:a16="http://schemas.microsoft.com/office/drawing/2014/main" id="{DF3B3585-C356-4892-88F2-9545EA2A0EB4}"/>
+              </a:ext>
+            </a:extLst>
+          </p:cNvPr>
+          <p:cNvSpPr/>
+          <p:nvPr/>
+        </p:nvSpPr>
+        <p:spPr>
+          <a:xfrm>
+            <a:off x="5755140" y="3312254"/>
+            <a:ext cx="2695719" cy="507316"/>
+          </a:xfrm>
+          <a:prstGeom prst="rect">
+            <a:avLst/>
+          </a:prstGeom>
+        </p:spPr>
+        <p:style>
+          <a:lnRef idx="2">
+            <a:schemeClr val="accent1"/>
+          </a:lnRef>
+          <a:fillRef idx="1">
+            <a:schemeClr val="lt1"/>
+          </a:fillRef>
+          <a:effectRef idx="0">
+            <a:schemeClr val="accent1"/>
+          </a:effectRef>
+          <a:fontRef idx="minor">
+            <a:schemeClr val="dk1"/>
+          </a:fontRef>
+        </p:style>
+        <p:txBody>
+          <a:bodyPr rtlCol="0" anchor="ctr"/>
+          <a:lstStyle/>
+          <a:p>
+            <a:pPr algn="ctr"/>
+            <a:r>
+              <a:rPr kumimoji="1" lang="en-US" altLang="ja-JP" sz="1400" dirty="0" err="1"/>
+              <a:t>SnippetDetail</a:t>
+            </a:r>
+            <a:endParaRPr kumimoji="1" lang="en-US" altLang="ja-JP" sz="1400" dirty="0"/>
+          </a:p>
+          <a:p>
+            <a:pPr algn="ctr"/>
+            <a:r>
+              <a:rPr kumimoji="1" lang="en-US" altLang="ja-JP" sz="1050" dirty="0"/>
+              <a:t>(</a:t>
+            </a:r>
+            <a:r>
+              <a:rPr kumimoji="1" lang="en-US" altLang="ja-JP" sz="1050" dirty="0" err="1"/>
+              <a:t>generics.RetriveUpdateDestroyAPIView</a:t>
+            </a:r>
+            <a:r>
+              <a:rPr kumimoji="1" lang="en-US" altLang="ja-JP" sz="1050" dirty="0"/>
+              <a:t>)</a:t>
+            </a:r>
+            <a:endParaRPr kumimoji="1" lang="ja-JP" altLang="en-US" sz="1050" dirty="0"/>
+          </a:p>
+        </p:txBody>
+      </p:sp>
+    </p:spTree>
+    <p:extLst>
+      <p:ext uri="{BB962C8B-B14F-4D97-AF65-F5344CB8AC3E}">
+        <p14:creationId xmlns:p14="http://schemas.microsoft.com/office/powerpoint/2010/main" val="517151155"/>
       </p:ext>
     </p:extLst>
   </p:cSld>

</xml_diff>